<commit_message>
Update Session 1 slide deck
Co-Authored-By: Claude Opus 4.6 <noreply@anthropic.com>
</commit_message>
<xml_diff>
--- a/slides/Session1Slides.pptx
+++ b/slides/Session1Slides.pptx
@@ -5,7 +5,7 @@
     <p:sldMasterId id="2147483648" r:id="rId1"/>
   </p:sldMasterIdLst>
   <p:notesMasterIdLst>
-    <p:notesMasterId r:id="rId13"/>
+    <p:notesMasterId r:id="rId12"/>
   </p:notesMasterIdLst>
   <p:sldIdLst>
     <p:sldId id="257" r:id="rId2"/>
@@ -14,11 +14,10 @@
     <p:sldId id="266" r:id="rId5"/>
     <p:sldId id="267" r:id="rId6"/>
     <p:sldId id="264" r:id="rId7"/>
-    <p:sldId id="261" r:id="rId8"/>
-    <p:sldId id="268" r:id="rId9"/>
-    <p:sldId id="269" r:id="rId10"/>
-    <p:sldId id="259" r:id="rId11"/>
-    <p:sldId id="260" r:id="rId12"/>
+    <p:sldId id="270" r:id="rId8"/>
+    <p:sldId id="261" r:id="rId9"/>
+    <p:sldId id="259" r:id="rId10"/>
+    <p:sldId id="260" r:id="rId11"/>
   </p:sldIdLst>
   <p:sldSz cx="9144000" cy="5143500" type="screen16x9"/>
   <p:notesSz cx="6858000" cy="9144000"/>
@@ -3611,6 +3610,1491 @@
 </file>
 
 <file path=ppt/slides/slide10.xml><?xml version="1.0" encoding="utf-8"?>
+<p:sld xmlns:a="http://schemas.openxmlformats.org/drawingml/2006/main" xmlns:r="http://schemas.openxmlformats.org/officeDocument/2006/relationships" xmlns:p="http://schemas.openxmlformats.org/presentationml/2006/main">
+  <p:cSld>
+    <p:spTree>
+      <p:nvGrpSpPr>
+        <p:cNvPr id="1" name=""/>
+        <p:cNvGrpSpPr/>
+        <p:nvPr/>
+      </p:nvGrpSpPr>
+      <p:grpSpPr>
+        <a:xfrm>
+          <a:off x="0" y="0"/>
+          <a:ext cx="0" cy="0"/>
+          <a:chOff x="0" y="0"/>
+          <a:chExt cx="0" cy="0"/>
+        </a:xfrm>
+      </p:grpSpPr>
+      <p:pic>
+        <p:nvPicPr>
+          <p:cNvPr id="2" name="Picture 1">
+            <a:extLst>
+              <a:ext uri="{FF2B5EF4-FFF2-40B4-BE49-F238E27FC236}">
+                <a16:creationId xmlns:a16="http://schemas.microsoft.com/office/drawing/2014/main" id="{4B51DF18-9487-3998-7AE0-B11317BE37CA}"/>
+              </a:ext>
+            </a:extLst>
+          </p:cNvPr>
+          <p:cNvPicPr>
+            <a:picLocks noChangeAspect="1"/>
+          </p:cNvPicPr>
+          <p:nvPr/>
+        </p:nvPicPr>
+        <p:blipFill>
+          <a:blip r:embed="rId2"/>
+          <a:stretch>
+            <a:fillRect/>
+          </a:stretch>
+        </p:blipFill>
+        <p:spPr>
+          <a:xfrm>
+            <a:off x="924128" y="249198"/>
+            <a:ext cx="4284899" cy="4227957"/>
+          </a:xfrm>
+          <a:prstGeom prst="rect">
+            <a:avLst/>
+          </a:prstGeom>
+        </p:spPr>
+      </p:pic>
+      <p:sp>
+        <p:nvSpPr>
+          <p:cNvPr id="3" name="TextBox 2">
+            <a:extLst>
+              <a:ext uri="{FF2B5EF4-FFF2-40B4-BE49-F238E27FC236}">
+                <a16:creationId xmlns:a16="http://schemas.microsoft.com/office/drawing/2014/main" id="{FE42A613-D3BA-6F30-0772-FA181D3A49E7}"/>
+              </a:ext>
+            </a:extLst>
+          </p:cNvPr>
+          <p:cNvSpPr txBox="1"/>
+          <p:nvPr/>
+        </p:nvSpPr>
+        <p:spPr>
+          <a:xfrm>
+            <a:off x="5632315" y="1527242"/>
+            <a:ext cx="2149819" cy="1200329"/>
+          </a:xfrm>
+          <a:prstGeom prst="rect">
+            <a:avLst/>
+          </a:prstGeom>
+          <a:noFill/>
+        </p:spPr>
+        <p:txBody>
+          <a:bodyPr wrap="none" rtlCol="0">
+            <a:spAutoFit/>
+          </a:bodyPr>
+          <a:lstStyle/>
+          <a:p>
+            <a:r>
+              <a:rPr lang="en-US" dirty="0"/>
+              <a:t>Tell us how we did!</a:t>
+            </a:r>
+          </a:p>
+          <a:p>
+            <a:endParaRPr lang="en-US" dirty="0"/>
+          </a:p>
+          <a:p>
+            <a:r>
+              <a:rPr lang="en-US" dirty="0">
+                <a:hlinkClick r:id="rId3"/>
+              </a:rPr>
+              <a:t>https://bit.ly/4rlIBCt</a:t>
+            </a:r>
+            <a:r>
+              <a:rPr lang="en-US" dirty="0"/>
+              <a:t> </a:t>
+            </a:r>
+          </a:p>
+          <a:p>
+            <a:endParaRPr lang="en-US" dirty="0"/>
+          </a:p>
+        </p:txBody>
+      </p:sp>
+    </p:spTree>
+    <p:extLst>
+      <p:ext uri="{BB962C8B-B14F-4D97-AF65-F5344CB8AC3E}">
+        <p14:creationId xmlns:p14="http://schemas.microsoft.com/office/powerpoint/2010/main" val="3141925060"/>
+      </p:ext>
+    </p:extLst>
+  </p:cSld>
+  <p:clrMapOvr>
+    <a:masterClrMapping/>
+  </p:clrMapOvr>
+</p:sld>
+</file>
+
+<file path=ppt/slides/slide2.xml><?xml version="1.0" encoding="utf-8"?>
+<p:sld xmlns:a="http://schemas.openxmlformats.org/drawingml/2006/main" xmlns:r="http://schemas.openxmlformats.org/officeDocument/2006/relationships" xmlns:p="http://schemas.openxmlformats.org/presentationml/2006/main">
+  <p:cSld>
+    <p:spTree>
+      <p:nvGrpSpPr>
+        <p:cNvPr id="1" name="">
+          <a:extLst>
+            <a:ext uri="{FF2B5EF4-FFF2-40B4-BE49-F238E27FC236}">
+              <a16:creationId xmlns:a16="http://schemas.microsoft.com/office/drawing/2014/main" id="{EE533AC4-99A1-4BDD-4014-656B2E0E2DE8}"/>
+            </a:ext>
+          </a:extLst>
+        </p:cNvPr>
+        <p:cNvGrpSpPr/>
+        <p:nvPr/>
+      </p:nvGrpSpPr>
+      <p:grpSpPr>
+        <a:xfrm>
+          <a:off x="0" y="0"/>
+          <a:ext cx="0" cy="0"/>
+          <a:chOff x="0" y="0"/>
+          <a:chExt cx="0" cy="0"/>
+        </a:xfrm>
+      </p:grpSpPr>
+      <p:sp>
+        <p:nvSpPr>
+          <p:cNvPr id="2" name="TextBox 1">
+            <a:extLst>
+              <a:ext uri="{FF2B5EF4-FFF2-40B4-BE49-F238E27FC236}">
+                <a16:creationId xmlns:a16="http://schemas.microsoft.com/office/drawing/2014/main" id="{61F08614-C5D0-8939-4A5B-0E75B997BB5E}"/>
+              </a:ext>
+            </a:extLst>
+          </p:cNvPr>
+          <p:cNvSpPr txBox="1"/>
+          <p:nvPr/>
+        </p:nvSpPr>
+        <p:spPr>
+          <a:xfrm>
+            <a:off x="527404" y="502584"/>
+            <a:ext cx="3506802" cy="1077218"/>
+          </a:xfrm>
+          <a:prstGeom prst="rect">
+            <a:avLst/>
+          </a:prstGeom>
+          <a:noFill/>
+        </p:spPr>
+        <p:txBody>
+          <a:bodyPr wrap="square">
+            <a:spAutoFit/>
+          </a:bodyPr>
+          <a:lstStyle/>
+          <a:p>
+            <a:pPr algn="r">
+              <a:defRPr sz="3200" b="1">
+                <a:solidFill>
+                  <a:srgbClr val="1A73E8"/>
+                </a:solidFill>
+              </a:defRPr>
+            </a:pPr>
+            <a:r>
+              <a:rPr lang="en-US" sz="3200" dirty="0"/>
+              <a:t>AI is changing how we do research</a:t>
+            </a:r>
+            <a:endParaRPr sz="3200" dirty="0"/>
+          </a:p>
+        </p:txBody>
+      </p:sp>
+      <p:pic>
+        <p:nvPicPr>
+          <p:cNvPr id="4" name="Picture 3">
+            <a:extLst>
+              <a:ext uri="{FF2B5EF4-FFF2-40B4-BE49-F238E27FC236}">
+                <a16:creationId xmlns:a16="http://schemas.microsoft.com/office/drawing/2014/main" id="{01D86E91-A260-A646-42DC-8D660E17C294}"/>
+              </a:ext>
+            </a:extLst>
+          </p:cNvPr>
+          <p:cNvPicPr>
+            <a:picLocks noChangeAspect="1"/>
+          </p:cNvPicPr>
+          <p:nvPr/>
+        </p:nvPicPr>
+        <p:blipFill>
+          <a:blip r:embed="rId2"/>
+          <a:stretch>
+            <a:fillRect/>
+          </a:stretch>
+        </p:blipFill>
+        <p:spPr>
+          <a:xfrm>
+            <a:off x="4541153" y="0"/>
+            <a:ext cx="4619110" cy="4408085"/>
+          </a:xfrm>
+          <a:prstGeom prst="rect">
+            <a:avLst/>
+          </a:prstGeom>
+        </p:spPr>
+      </p:pic>
+      <p:sp>
+        <p:nvSpPr>
+          <p:cNvPr id="5" name="TextBox 4">
+            <a:extLst>
+              <a:ext uri="{FF2B5EF4-FFF2-40B4-BE49-F238E27FC236}">
+                <a16:creationId xmlns:a16="http://schemas.microsoft.com/office/drawing/2014/main" id="{689115F5-07D8-9D70-AB5A-49CD116173C4}"/>
+              </a:ext>
+            </a:extLst>
+          </p:cNvPr>
+          <p:cNvSpPr txBox="1"/>
+          <p:nvPr/>
+        </p:nvSpPr>
+        <p:spPr>
+          <a:xfrm>
+            <a:off x="7592507" y="856527"/>
+            <a:ext cx="1389932" cy="369332"/>
+          </a:xfrm>
+          <a:prstGeom prst="rect">
+            <a:avLst/>
+          </a:prstGeom>
+          <a:noFill/>
+        </p:spPr>
+        <p:txBody>
+          <a:bodyPr wrap="none" rtlCol="0">
+            <a:spAutoFit/>
+          </a:bodyPr>
+          <a:lstStyle/>
+          <a:p>
+            <a:r>
+              <a:rPr lang="en-US" dirty="0"/>
+              <a:t>Feb 14, 2026</a:t>
+            </a:r>
+          </a:p>
+        </p:txBody>
+      </p:sp>
+      <p:pic>
+        <p:nvPicPr>
+          <p:cNvPr id="6" name="Picture 5">
+            <a:extLst>
+              <a:ext uri="{FF2B5EF4-FFF2-40B4-BE49-F238E27FC236}">
+                <a16:creationId xmlns:a16="http://schemas.microsoft.com/office/drawing/2014/main" id="{5A10CF1C-EC96-D38A-2A79-A5585AB07E93}"/>
+              </a:ext>
+            </a:extLst>
+          </p:cNvPr>
+          <p:cNvPicPr>
+            <a:picLocks noChangeAspect="1"/>
+          </p:cNvPicPr>
+          <p:nvPr/>
+        </p:nvPicPr>
+        <p:blipFill>
+          <a:blip r:embed="rId3"/>
+          <a:stretch>
+            <a:fillRect/>
+          </a:stretch>
+        </p:blipFill>
+        <p:spPr>
+          <a:xfrm>
+            <a:off x="78208" y="2326510"/>
+            <a:ext cx="4405194" cy="2081575"/>
+          </a:xfrm>
+          <a:prstGeom prst="rect">
+            <a:avLst/>
+          </a:prstGeom>
+        </p:spPr>
+      </p:pic>
+    </p:spTree>
+    <p:extLst>
+      <p:ext uri="{BB962C8B-B14F-4D97-AF65-F5344CB8AC3E}">
+        <p14:creationId xmlns:p14="http://schemas.microsoft.com/office/powerpoint/2010/main" val="378828955"/>
+      </p:ext>
+    </p:extLst>
+  </p:cSld>
+  <p:clrMapOvr>
+    <a:masterClrMapping/>
+  </p:clrMapOvr>
+</p:sld>
+</file>
+
+<file path=ppt/slides/slide3.xml><?xml version="1.0" encoding="utf-8"?>
+<p:sld xmlns:a="http://schemas.openxmlformats.org/drawingml/2006/main" xmlns:r="http://schemas.openxmlformats.org/officeDocument/2006/relationships" xmlns:p="http://schemas.openxmlformats.org/presentationml/2006/main">
+  <p:cSld>
+    <p:spTree>
+      <p:nvGrpSpPr>
+        <p:cNvPr id="1" name="">
+          <a:extLst>
+            <a:ext uri="{FF2B5EF4-FFF2-40B4-BE49-F238E27FC236}">
+              <a16:creationId xmlns:a16="http://schemas.microsoft.com/office/drawing/2014/main" id="{C95E8DDE-63AD-35ED-2175-F71B3B719929}"/>
+            </a:ext>
+          </a:extLst>
+        </p:cNvPr>
+        <p:cNvGrpSpPr/>
+        <p:nvPr/>
+      </p:nvGrpSpPr>
+      <p:grpSpPr>
+        <a:xfrm>
+          <a:off x="0" y="0"/>
+          <a:ext cx="0" cy="0"/>
+          <a:chOff x="0" y="0"/>
+          <a:chExt cx="0" cy="0"/>
+        </a:xfrm>
+      </p:grpSpPr>
+      <p:sp>
+        <p:nvSpPr>
+          <p:cNvPr id="2" name="TextBox 1">
+            <a:extLst>
+              <a:ext uri="{FF2B5EF4-FFF2-40B4-BE49-F238E27FC236}">
+                <a16:creationId xmlns:a16="http://schemas.microsoft.com/office/drawing/2014/main" id="{F5028EDF-53C8-37C1-DB8D-A995A699B335}"/>
+              </a:ext>
+            </a:extLst>
+          </p:cNvPr>
+          <p:cNvSpPr txBox="1"/>
+          <p:nvPr/>
+        </p:nvSpPr>
+        <p:spPr>
+          <a:xfrm>
+            <a:off x="328432" y="298337"/>
+            <a:ext cx="6635663" cy="461665"/>
+          </a:xfrm>
+          <a:prstGeom prst="rect">
+            <a:avLst/>
+          </a:prstGeom>
+          <a:noFill/>
+        </p:spPr>
+        <p:txBody>
+          <a:bodyPr wrap="none">
+            <a:spAutoFit/>
+          </a:bodyPr>
+          <a:lstStyle/>
+          <a:p>
+            <a:pPr>
+              <a:defRPr sz="3200" b="1">
+                <a:solidFill>
+                  <a:srgbClr val="1A73E8"/>
+                </a:solidFill>
+              </a:defRPr>
+            </a:pPr>
+            <a:r>
+              <a:rPr sz="2400" dirty="0"/>
+              <a:t> </a:t>
+            </a:r>
+            <a:r>
+              <a:rPr lang="en-US" sz="2400" dirty="0"/>
+              <a:t>Three initial sessions, five more after Spring Break</a:t>
+            </a:r>
+            <a:endParaRPr sz="2400" dirty="0"/>
+          </a:p>
+        </p:txBody>
+      </p:sp>
+      <p:sp>
+        <p:nvSpPr>
+          <p:cNvPr id="3" name="TextBox 2">
+            <a:extLst>
+              <a:ext uri="{FF2B5EF4-FFF2-40B4-BE49-F238E27FC236}">
+                <a16:creationId xmlns:a16="http://schemas.microsoft.com/office/drawing/2014/main" id="{F74133A0-EFF7-84C3-9179-6C3B85B72031}"/>
+              </a:ext>
+            </a:extLst>
+          </p:cNvPr>
+          <p:cNvSpPr txBox="1"/>
+          <p:nvPr/>
+        </p:nvSpPr>
+        <p:spPr>
+          <a:xfrm>
+            <a:off x="81023" y="886673"/>
+            <a:ext cx="8981954" cy="3370153"/>
+          </a:xfrm>
+          <a:prstGeom prst="rect">
+            <a:avLst/>
+          </a:prstGeom>
+          <a:noFill/>
+        </p:spPr>
+        <p:txBody>
+          <a:bodyPr wrap="square">
+            <a:spAutoFit/>
+          </a:bodyPr>
+          <a:lstStyle/>
+          <a:p>
+            <a:pPr>
+              <a:spcAft>
+                <a:spcPts val="900"/>
+              </a:spcAft>
+              <a:defRPr sz="2000"/>
+            </a:pPr>
+            <a:r>
+              <a:rPr lang="en-US" sz="2400" dirty="0"/>
+              <a:t>Session 1, Today: Google toolkit: Gemini, </a:t>
+            </a:r>
+            <a:r>
+              <a:rPr sz="2400" dirty="0"/>
+              <a:t>NotebookLM &amp; Custom Gems</a:t>
+            </a:r>
+          </a:p>
+          <a:p>
+            <a:pPr>
+              <a:spcAft>
+                <a:spcPts val="900"/>
+              </a:spcAft>
+              <a:defRPr sz="2000"/>
+            </a:pPr>
+            <a:r>
+              <a:rPr lang="en-US" sz="2400" dirty="0"/>
+              <a:t>Session 2, Friday Feb 27: Integration of AI with Python notebooks</a:t>
+            </a:r>
+          </a:p>
+          <a:p>
+            <a:pPr>
+              <a:spcAft>
+                <a:spcPts val="900"/>
+              </a:spcAft>
+              <a:defRPr sz="2000"/>
+            </a:pPr>
+            <a:r>
+              <a:rPr lang="en-US" sz="2400" dirty="0"/>
+              <a:t>Session 3, Friday March 6: Claude Code command line interface. </a:t>
+            </a:r>
+          </a:p>
+          <a:p>
+            <a:pPr>
+              <a:spcAft>
+                <a:spcPts val="900"/>
+              </a:spcAft>
+              <a:defRPr sz="2000"/>
+            </a:pPr>
+            <a:endParaRPr lang="en-US" sz="2400" dirty="0"/>
+          </a:p>
+          <a:p>
+            <a:pPr>
+              <a:spcAft>
+                <a:spcPts val="900"/>
+              </a:spcAft>
+              <a:defRPr sz="2000"/>
+            </a:pPr>
+            <a:r>
+              <a:rPr lang="en-US" sz="2400" dirty="0"/>
+              <a:t>Link for home page:  </a:t>
+            </a:r>
+          </a:p>
+          <a:p>
+            <a:pPr>
+              <a:spcAft>
+                <a:spcPts val="900"/>
+              </a:spcAft>
+              <a:defRPr sz="2000"/>
+            </a:pPr>
+            <a:r>
+              <a:rPr lang="en-US" sz="2400" dirty="0">
+                <a:hlinkClick r:id="rId2"/>
+              </a:rPr>
+              <a:t>https://bit.ly/3ZxtPw8</a:t>
+            </a:r>
+            <a:r>
+              <a:rPr lang="en-US" sz="2400" dirty="0"/>
+              <a:t> </a:t>
+            </a:r>
+            <a:endParaRPr sz="2400" dirty="0"/>
+          </a:p>
+          <a:p>
+            <a:pPr>
+              <a:spcAft>
+                <a:spcPts val="900"/>
+              </a:spcAft>
+              <a:defRPr sz="2000"/>
+            </a:pPr>
+            <a:endParaRPr sz="2400" dirty="0"/>
+          </a:p>
+        </p:txBody>
+      </p:sp>
+      <p:pic>
+        <p:nvPicPr>
+          <p:cNvPr id="4" name="Picture 3">
+            <a:extLst>
+              <a:ext uri="{FF2B5EF4-FFF2-40B4-BE49-F238E27FC236}">
+                <a16:creationId xmlns:a16="http://schemas.microsoft.com/office/drawing/2014/main" id="{F8F9814F-909E-AC21-77A0-7A196A9DF581}"/>
+              </a:ext>
+            </a:extLst>
+          </p:cNvPr>
+          <p:cNvPicPr>
+            <a:picLocks noChangeAspect="1"/>
+          </p:cNvPicPr>
+          <p:nvPr/>
+        </p:nvPicPr>
+        <p:blipFill>
+          <a:blip r:embed="rId3"/>
+          <a:stretch>
+            <a:fillRect/>
+          </a:stretch>
+        </p:blipFill>
+        <p:spPr>
+          <a:xfrm>
+            <a:off x="3402957" y="2344183"/>
+            <a:ext cx="2039314" cy="2039314"/>
+          </a:xfrm>
+          <a:prstGeom prst="rect">
+            <a:avLst/>
+          </a:prstGeom>
+        </p:spPr>
+      </p:pic>
+    </p:spTree>
+    <p:extLst>
+      <p:ext uri="{BB962C8B-B14F-4D97-AF65-F5344CB8AC3E}">
+        <p14:creationId xmlns:p14="http://schemas.microsoft.com/office/powerpoint/2010/main" val="218621694"/>
+      </p:ext>
+    </p:extLst>
+  </p:cSld>
+  <p:clrMapOvr>
+    <a:masterClrMapping/>
+  </p:clrMapOvr>
+</p:sld>
+</file>
+
+<file path=ppt/slides/slide4.xml><?xml version="1.0" encoding="utf-8"?>
+<p:sld xmlns:a="http://schemas.openxmlformats.org/drawingml/2006/main" xmlns:r="http://schemas.openxmlformats.org/officeDocument/2006/relationships" xmlns:p="http://schemas.openxmlformats.org/presentationml/2006/main">
+  <p:cSld>
+    <p:spTree>
+      <p:nvGrpSpPr>
+        <p:cNvPr id="1" name=""/>
+        <p:cNvGrpSpPr/>
+        <p:nvPr/>
+      </p:nvGrpSpPr>
+      <p:grpSpPr>
+        <a:xfrm>
+          <a:off x="0" y="0"/>
+          <a:ext cx="0" cy="0"/>
+          <a:chOff x="0" y="0"/>
+          <a:chExt cx="0" cy="0"/>
+        </a:xfrm>
+      </p:grpSpPr>
+      <p:pic>
+        <p:nvPicPr>
+          <p:cNvPr id="2" name="Picture 1">
+            <a:extLst>
+              <a:ext uri="{FF2B5EF4-FFF2-40B4-BE49-F238E27FC236}">
+                <a16:creationId xmlns:a16="http://schemas.microsoft.com/office/drawing/2014/main" id="{1B1AC3F0-3510-205D-1F23-95E41EC09B68}"/>
+              </a:ext>
+            </a:extLst>
+          </p:cNvPr>
+          <p:cNvPicPr>
+            <a:picLocks noChangeAspect="1"/>
+          </p:cNvPicPr>
+          <p:nvPr/>
+        </p:nvPicPr>
+        <p:blipFill>
+          <a:blip r:embed="rId2"/>
+          <a:stretch>
+            <a:fillRect/>
+          </a:stretch>
+        </p:blipFill>
+        <p:spPr>
+          <a:xfrm>
+            <a:off x="685800" y="0"/>
+            <a:ext cx="7772400" cy="4580164"/>
+          </a:xfrm>
+          <a:prstGeom prst="rect">
+            <a:avLst/>
+          </a:prstGeom>
+        </p:spPr>
+      </p:pic>
+    </p:spTree>
+    <p:extLst>
+      <p:ext uri="{BB962C8B-B14F-4D97-AF65-F5344CB8AC3E}">
+        <p14:creationId xmlns:p14="http://schemas.microsoft.com/office/powerpoint/2010/main" val="2664871968"/>
+      </p:ext>
+    </p:extLst>
+  </p:cSld>
+  <p:clrMapOvr>
+    <a:masterClrMapping/>
+  </p:clrMapOvr>
+</p:sld>
+</file>
+
+<file path=ppt/slides/slide5.xml><?xml version="1.0" encoding="utf-8"?>
+<p:sld xmlns:a="http://schemas.openxmlformats.org/drawingml/2006/main" xmlns:r="http://schemas.openxmlformats.org/officeDocument/2006/relationships" xmlns:p="http://schemas.openxmlformats.org/presentationml/2006/main">
+  <p:cSld>
+    <p:spTree>
+      <p:nvGrpSpPr>
+        <p:cNvPr id="1" name="">
+          <a:extLst>
+            <a:ext uri="{FF2B5EF4-FFF2-40B4-BE49-F238E27FC236}">
+              <a16:creationId xmlns:a16="http://schemas.microsoft.com/office/drawing/2014/main" id="{75D70F11-22A2-37E5-B8C6-1B05561155BF}"/>
+            </a:ext>
+          </a:extLst>
+        </p:cNvPr>
+        <p:cNvGrpSpPr/>
+        <p:nvPr/>
+      </p:nvGrpSpPr>
+      <p:grpSpPr>
+        <a:xfrm>
+          <a:off x="0" y="0"/>
+          <a:ext cx="0" cy="0"/>
+          <a:chOff x="0" y="0"/>
+          <a:chExt cx="0" cy="0"/>
+        </a:xfrm>
+      </p:grpSpPr>
+      <p:pic>
+        <p:nvPicPr>
+          <p:cNvPr id="2" name="Picture 1">
+            <a:extLst>
+              <a:ext uri="{FF2B5EF4-FFF2-40B4-BE49-F238E27FC236}">
+                <a16:creationId xmlns:a16="http://schemas.microsoft.com/office/drawing/2014/main" id="{240732A3-4947-2275-2BCA-330EE6285126}"/>
+              </a:ext>
+            </a:extLst>
+          </p:cNvPr>
+          <p:cNvPicPr>
+            <a:picLocks noChangeAspect="1"/>
+          </p:cNvPicPr>
+          <p:nvPr/>
+        </p:nvPicPr>
+        <p:blipFill>
+          <a:blip r:embed="rId2"/>
+          <a:stretch>
+            <a:fillRect/>
+          </a:stretch>
+        </p:blipFill>
+        <p:spPr>
+          <a:xfrm>
+            <a:off x="685800" y="168288"/>
+            <a:ext cx="7772400" cy="4181889"/>
+          </a:xfrm>
+          <a:prstGeom prst="rect">
+            <a:avLst/>
+          </a:prstGeom>
+        </p:spPr>
+      </p:pic>
+    </p:spTree>
+    <p:extLst>
+      <p:ext uri="{BB962C8B-B14F-4D97-AF65-F5344CB8AC3E}">
+        <p14:creationId xmlns:p14="http://schemas.microsoft.com/office/powerpoint/2010/main" val="3763632779"/>
+      </p:ext>
+    </p:extLst>
+  </p:cSld>
+  <p:clrMapOvr>
+    <a:masterClrMapping/>
+  </p:clrMapOvr>
+</p:sld>
+</file>
+
+<file path=ppt/slides/slide6.xml><?xml version="1.0" encoding="utf-8"?>
+<p:sld xmlns:a="http://schemas.openxmlformats.org/drawingml/2006/main" xmlns:r="http://schemas.openxmlformats.org/officeDocument/2006/relationships" xmlns:p="http://schemas.openxmlformats.org/presentationml/2006/main">
+  <p:cSld>
+    <p:spTree>
+      <p:nvGrpSpPr>
+        <p:cNvPr id="1" name="">
+          <a:extLst>
+            <a:ext uri="{FF2B5EF4-FFF2-40B4-BE49-F238E27FC236}">
+              <a16:creationId xmlns:a16="http://schemas.microsoft.com/office/drawing/2014/main" id="{423B50B0-117D-52E3-2882-1348ADEEAD39}"/>
+            </a:ext>
+          </a:extLst>
+        </p:cNvPr>
+        <p:cNvGrpSpPr/>
+        <p:nvPr/>
+      </p:nvGrpSpPr>
+      <p:grpSpPr>
+        <a:xfrm>
+          <a:off x="0" y="0"/>
+          <a:ext cx="0" cy="0"/>
+          <a:chOff x="0" y="0"/>
+          <a:chExt cx="0" cy="0"/>
+        </a:xfrm>
+      </p:grpSpPr>
+      <p:pic>
+        <p:nvPicPr>
+          <p:cNvPr id="4" name="Picture 3">
+            <a:extLst>
+              <a:ext uri="{FF2B5EF4-FFF2-40B4-BE49-F238E27FC236}">
+                <a16:creationId xmlns:a16="http://schemas.microsoft.com/office/drawing/2014/main" id="{DC3E1435-7B34-AE60-3826-D52489AD3C48}"/>
+              </a:ext>
+            </a:extLst>
+          </p:cNvPr>
+          <p:cNvPicPr>
+            <a:picLocks noChangeAspect="1"/>
+          </p:cNvPicPr>
+          <p:nvPr/>
+        </p:nvPicPr>
+        <p:blipFill>
+          <a:blip r:embed="rId2"/>
+          <a:stretch>
+            <a:fillRect/>
+          </a:stretch>
+        </p:blipFill>
+        <p:spPr>
+          <a:xfrm>
+            <a:off x="685800" y="601383"/>
+            <a:ext cx="7772400" cy="3639792"/>
+          </a:xfrm>
+          <a:prstGeom prst="rect">
+            <a:avLst/>
+          </a:prstGeom>
+        </p:spPr>
+      </p:pic>
+    </p:spTree>
+    <p:extLst>
+      <p:ext uri="{BB962C8B-B14F-4D97-AF65-F5344CB8AC3E}">
+        <p14:creationId xmlns:p14="http://schemas.microsoft.com/office/powerpoint/2010/main" val="2614732407"/>
+      </p:ext>
+    </p:extLst>
+  </p:cSld>
+  <p:clrMapOvr>
+    <a:masterClrMapping/>
+  </p:clrMapOvr>
+</p:sld>
+</file>
+
+<file path=ppt/slides/slide7.xml><?xml version="1.0" encoding="utf-8"?>
+<p:sld xmlns:a="http://schemas.openxmlformats.org/drawingml/2006/main" xmlns:r="http://schemas.openxmlformats.org/officeDocument/2006/relationships" xmlns:p="http://schemas.openxmlformats.org/presentationml/2006/main">
+  <p:cSld>
+    <p:spTree>
+      <p:nvGrpSpPr>
+        <p:cNvPr id="1" name=""/>
+        <p:cNvGrpSpPr/>
+        <p:nvPr/>
+      </p:nvGrpSpPr>
+      <p:grpSpPr>
+        <a:xfrm>
+          <a:off x="0" y="0"/>
+          <a:ext cx="0" cy="0"/>
+          <a:chOff x="0" y="0"/>
+          <a:chExt cx="0" cy="0"/>
+        </a:xfrm>
+      </p:grpSpPr>
+      <p:sp>
+        <p:nvSpPr>
+          <p:cNvPr id="2" name="Title 1">
+            <a:extLst>
+              <a:ext uri="{FF2B5EF4-FFF2-40B4-BE49-F238E27FC236}">
+                <a16:creationId xmlns:a16="http://schemas.microsoft.com/office/drawing/2014/main" id="{95292584-E9E6-23BE-CC6E-817D07745679}"/>
+              </a:ext>
+            </a:extLst>
+          </p:cNvPr>
+          <p:cNvSpPr>
+            <a:spLocks noGrp="1"/>
+          </p:cNvSpPr>
+          <p:nvPr>
+            <p:ph type="title"/>
+          </p:nvPr>
+        </p:nvSpPr>
+        <p:spPr>
+          <a:xfrm>
+            <a:off x="36654" y="0"/>
+            <a:ext cx="8052124" cy="554713"/>
+          </a:xfrm>
+        </p:spPr>
+        <p:txBody>
+          <a:bodyPr>
+            <a:normAutofit fontScale="90000"/>
+          </a:bodyPr>
+          <a:lstStyle/>
+          <a:p>
+            <a:pPr algn="l"/>
+            <a:r>
+              <a:rPr lang="en-US" dirty="0"/>
+              <a:t>Quadrants of competencies</a:t>
+            </a:r>
+          </a:p>
+        </p:txBody>
+      </p:sp>
+      <p:cxnSp>
+        <p:nvCxnSpPr>
+          <p:cNvPr id="5" name="Straight Connector 4">
+            <a:extLst>
+              <a:ext uri="{FF2B5EF4-FFF2-40B4-BE49-F238E27FC236}">
+                <a16:creationId xmlns:a16="http://schemas.microsoft.com/office/drawing/2014/main" id="{FE950A1A-98B0-7773-C172-4272EE0B38D2}"/>
+              </a:ext>
+            </a:extLst>
+          </p:cNvPr>
+          <p:cNvCxnSpPr/>
+          <p:nvPr/>
+        </p:nvCxnSpPr>
+        <p:spPr>
+          <a:xfrm>
+            <a:off x="891251" y="2407534"/>
+            <a:ext cx="6539696" cy="0"/>
+          </a:xfrm>
+          <a:prstGeom prst="line">
+            <a:avLst/>
+          </a:prstGeom>
+        </p:spPr>
+        <p:style>
+          <a:lnRef idx="2">
+            <a:schemeClr val="accent1"/>
+          </a:lnRef>
+          <a:fillRef idx="0">
+            <a:schemeClr val="accent1"/>
+          </a:fillRef>
+          <a:effectRef idx="1">
+            <a:schemeClr val="accent1"/>
+          </a:effectRef>
+          <a:fontRef idx="minor">
+            <a:schemeClr val="tx1"/>
+          </a:fontRef>
+        </p:style>
+      </p:cxnSp>
+      <p:cxnSp>
+        <p:nvCxnSpPr>
+          <p:cNvPr id="6" name="Straight Connector 5">
+            <a:extLst>
+              <a:ext uri="{FF2B5EF4-FFF2-40B4-BE49-F238E27FC236}">
+                <a16:creationId xmlns:a16="http://schemas.microsoft.com/office/drawing/2014/main" id="{90FD4079-BD7B-9A60-E6F7-FA49B5F1C9FD}"/>
+              </a:ext>
+            </a:extLst>
+          </p:cNvPr>
+          <p:cNvCxnSpPr>
+            <a:cxnSpLocks/>
+          </p:cNvCxnSpPr>
+          <p:nvPr/>
+        </p:nvCxnSpPr>
+        <p:spPr>
+          <a:xfrm flipH="1" flipV="1">
+            <a:off x="4151454" y="924046"/>
+            <a:ext cx="9645" cy="3150243"/>
+          </a:xfrm>
+          <a:prstGeom prst="line">
+            <a:avLst/>
+          </a:prstGeom>
+        </p:spPr>
+        <p:style>
+          <a:lnRef idx="2">
+            <a:schemeClr val="accent1"/>
+          </a:lnRef>
+          <a:fillRef idx="0">
+            <a:schemeClr val="accent1"/>
+          </a:fillRef>
+          <a:effectRef idx="1">
+            <a:schemeClr val="accent1"/>
+          </a:effectRef>
+          <a:fontRef idx="minor">
+            <a:schemeClr val="tx1"/>
+          </a:fontRef>
+        </p:style>
+      </p:cxnSp>
+      <p:sp>
+        <p:nvSpPr>
+          <p:cNvPr id="9" name="TextBox 8">
+            <a:extLst>
+              <a:ext uri="{FF2B5EF4-FFF2-40B4-BE49-F238E27FC236}">
+                <a16:creationId xmlns:a16="http://schemas.microsoft.com/office/drawing/2014/main" id="{3260F320-13EB-AFBE-1008-F9CDEE3A79EE}"/>
+              </a:ext>
+            </a:extLst>
+          </p:cNvPr>
+          <p:cNvSpPr txBox="1"/>
+          <p:nvPr/>
+        </p:nvSpPr>
+        <p:spPr>
+          <a:xfrm>
+            <a:off x="3357289" y="554714"/>
+            <a:ext cx="1637371" cy="369332"/>
+          </a:xfrm>
+          <a:prstGeom prst="rect">
+            <a:avLst/>
+          </a:prstGeom>
+          <a:noFill/>
+        </p:spPr>
+        <p:txBody>
+          <a:bodyPr wrap="none" rtlCol="0">
+            <a:spAutoFit/>
+          </a:bodyPr>
+          <a:lstStyle/>
+          <a:p>
+            <a:r>
+              <a:rPr lang="en-US" b="1" dirty="0"/>
+              <a:t>GIA proficiency</a:t>
+            </a:r>
+          </a:p>
+        </p:txBody>
+      </p:sp>
+      <p:sp>
+        <p:nvSpPr>
+          <p:cNvPr id="10" name="TextBox 9">
+            <a:extLst>
+              <a:ext uri="{FF2B5EF4-FFF2-40B4-BE49-F238E27FC236}">
+                <a16:creationId xmlns:a16="http://schemas.microsoft.com/office/drawing/2014/main" id="{0353FB1F-61AD-A353-8142-6CB40EEB25BA}"/>
+              </a:ext>
+            </a:extLst>
+          </p:cNvPr>
+          <p:cNvSpPr txBox="1"/>
+          <p:nvPr/>
+        </p:nvSpPr>
+        <p:spPr>
+          <a:xfrm>
+            <a:off x="7549253" y="2129835"/>
+            <a:ext cx="1065933" cy="646331"/>
+          </a:xfrm>
+          <a:prstGeom prst="rect">
+            <a:avLst/>
+          </a:prstGeom>
+          <a:noFill/>
+        </p:spPr>
+        <p:txBody>
+          <a:bodyPr wrap="none" rtlCol="0">
+            <a:spAutoFit/>
+          </a:bodyPr>
+          <a:lstStyle/>
+          <a:p>
+            <a:r>
+              <a:rPr lang="en-US" b="1" dirty="0"/>
+              <a:t>Domain </a:t>
+            </a:r>
+          </a:p>
+          <a:p>
+            <a:r>
+              <a:rPr lang="en-US" b="1" dirty="0"/>
+              <a:t>expertise</a:t>
+            </a:r>
+          </a:p>
+        </p:txBody>
+      </p:sp>
+      <p:sp>
+        <p:nvSpPr>
+          <p:cNvPr id="12" name="TextBox 11">
+            <a:extLst>
+              <a:ext uri="{FF2B5EF4-FFF2-40B4-BE49-F238E27FC236}">
+                <a16:creationId xmlns:a16="http://schemas.microsoft.com/office/drawing/2014/main" id="{09B6C8CE-E64D-4A85-7E99-A6C0282090D0}"/>
+              </a:ext>
+            </a:extLst>
+          </p:cNvPr>
+          <p:cNvSpPr txBox="1"/>
+          <p:nvPr/>
+        </p:nvSpPr>
+        <p:spPr>
+          <a:xfrm>
+            <a:off x="6899874" y="2222868"/>
+            <a:ext cx="590226" cy="369332"/>
+          </a:xfrm>
+          <a:prstGeom prst="rect">
+            <a:avLst/>
+          </a:prstGeom>
+          <a:solidFill>
+            <a:schemeClr val="bg1"/>
+          </a:solidFill>
+        </p:spPr>
+        <p:txBody>
+          <a:bodyPr wrap="none" rtlCol="0">
+            <a:spAutoFit/>
+          </a:bodyPr>
+          <a:lstStyle/>
+          <a:p>
+            <a:r>
+              <a:rPr lang="en-US" dirty="0"/>
+              <a:t>high</a:t>
+            </a:r>
+          </a:p>
+        </p:txBody>
+      </p:sp>
+      <p:sp>
+        <p:nvSpPr>
+          <p:cNvPr id="13" name="TextBox 12">
+            <a:extLst>
+              <a:ext uri="{FF2B5EF4-FFF2-40B4-BE49-F238E27FC236}">
+                <a16:creationId xmlns:a16="http://schemas.microsoft.com/office/drawing/2014/main" id="{3AFA0711-49E9-5FD8-280B-67875DE29A42}"/>
+              </a:ext>
+            </a:extLst>
+          </p:cNvPr>
+          <p:cNvSpPr txBox="1"/>
+          <p:nvPr/>
+        </p:nvSpPr>
+        <p:spPr>
+          <a:xfrm>
+            <a:off x="3865986" y="3787065"/>
+            <a:ext cx="523605" cy="369332"/>
+          </a:xfrm>
+          <a:prstGeom prst="rect">
+            <a:avLst/>
+          </a:prstGeom>
+          <a:solidFill>
+            <a:schemeClr val="bg1"/>
+          </a:solidFill>
+        </p:spPr>
+        <p:txBody>
+          <a:bodyPr wrap="none" rtlCol="0">
+            <a:spAutoFit/>
+          </a:bodyPr>
+          <a:lstStyle/>
+          <a:p>
+            <a:r>
+              <a:rPr lang="en-US" dirty="0"/>
+              <a:t>low</a:t>
+            </a:r>
+          </a:p>
+        </p:txBody>
+      </p:sp>
+      <p:sp>
+        <p:nvSpPr>
+          <p:cNvPr id="14" name="TextBox 13">
+            <a:extLst>
+              <a:ext uri="{FF2B5EF4-FFF2-40B4-BE49-F238E27FC236}">
+                <a16:creationId xmlns:a16="http://schemas.microsoft.com/office/drawing/2014/main" id="{CFAC4080-B9CF-E85E-CB1F-931833D50369}"/>
+              </a:ext>
+            </a:extLst>
+          </p:cNvPr>
+          <p:cNvSpPr txBox="1"/>
+          <p:nvPr/>
+        </p:nvSpPr>
+        <p:spPr>
+          <a:xfrm>
+            <a:off x="772945" y="2202418"/>
+            <a:ext cx="523605" cy="369332"/>
+          </a:xfrm>
+          <a:prstGeom prst="rect">
+            <a:avLst/>
+          </a:prstGeom>
+          <a:solidFill>
+            <a:schemeClr val="bg1"/>
+          </a:solidFill>
+        </p:spPr>
+        <p:txBody>
+          <a:bodyPr wrap="none" rtlCol="0">
+            <a:spAutoFit/>
+          </a:bodyPr>
+          <a:lstStyle/>
+          <a:p>
+            <a:r>
+              <a:rPr lang="en-US" dirty="0"/>
+              <a:t>low</a:t>
+            </a:r>
+          </a:p>
+        </p:txBody>
+      </p:sp>
+      <p:sp>
+        <p:nvSpPr>
+          <p:cNvPr id="15" name="TextBox 14">
+            <a:extLst>
+              <a:ext uri="{FF2B5EF4-FFF2-40B4-BE49-F238E27FC236}">
+                <a16:creationId xmlns:a16="http://schemas.microsoft.com/office/drawing/2014/main" id="{717001B5-E87D-933B-5698-4738F21B0911}"/>
+              </a:ext>
+            </a:extLst>
+          </p:cNvPr>
+          <p:cNvSpPr txBox="1"/>
+          <p:nvPr/>
+        </p:nvSpPr>
+        <p:spPr>
+          <a:xfrm>
+            <a:off x="3856341" y="843338"/>
+            <a:ext cx="590226" cy="369332"/>
+          </a:xfrm>
+          <a:prstGeom prst="rect">
+            <a:avLst/>
+          </a:prstGeom>
+          <a:solidFill>
+            <a:schemeClr val="bg1"/>
+          </a:solidFill>
+        </p:spPr>
+        <p:txBody>
+          <a:bodyPr wrap="none" rtlCol="0">
+            <a:spAutoFit/>
+          </a:bodyPr>
+          <a:lstStyle/>
+          <a:p>
+            <a:r>
+              <a:rPr lang="en-US" dirty="0"/>
+              <a:t>high</a:t>
+            </a:r>
+          </a:p>
+        </p:txBody>
+      </p:sp>
+      <p:sp>
+        <p:nvSpPr>
+          <p:cNvPr id="16" name="TextBox 15">
+            <a:extLst>
+              <a:ext uri="{FF2B5EF4-FFF2-40B4-BE49-F238E27FC236}">
+                <a16:creationId xmlns:a16="http://schemas.microsoft.com/office/drawing/2014/main" id="{B8AAB144-CE70-7575-CDD5-BA9F0B9C94D3}"/>
+              </a:ext>
+            </a:extLst>
+          </p:cNvPr>
+          <p:cNvSpPr txBox="1"/>
+          <p:nvPr/>
+        </p:nvSpPr>
+        <p:spPr>
+          <a:xfrm>
+            <a:off x="233420" y="681656"/>
+            <a:ext cx="2738775" cy="923330"/>
+          </a:xfrm>
+          <a:prstGeom prst="rect">
+            <a:avLst/>
+          </a:prstGeom>
+          <a:noFill/>
+          <a:ln>
+            <a:solidFill>
+              <a:srgbClr val="7030A0"/>
+            </a:solidFill>
+          </a:ln>
+        </p:spPr>
+        <p:txBody>
+          <a:bodyPr wrap="square" rtlCol="0">
+            <a:spAutoFit/>
+          </a:bodyPr>
+          <a:lstStyle/>
+          <a:p>
+            <a:r>
+              <a:rPr lang="en-US" dirty="0"/>
+              <a:t>amateur scientists</a:t>
+            </a:r>
+          </a:p>
+          <a:p>
+            <a:r>
+              <a:rPr lang="en-US" dirty="0"/>
+              <a:t>                   &amp;</a:t>
+            </a:r>
+          </a:p>
+          <a:p>
+            <a:r>
+              <a:rPr lang="en-US" dirty="0"/>
+              <a:t>Some undergraduates</a:t>
+            </a:r>
+          </a:p>
+        </p:txBody>
+      </p:sp>
+      <p:sp>
+        <p:nvSpPr>
+          <p:cNvPr id="17" name="TextBox 16">
+            <a:extLst>
+              <a:ext uri="{FF2B5EF4-FFF2-40B4-BE49-F238E27FC236}">
+                <a16:creationId xmlns:a16="http://schemas.microsoft.com/office/drawing/2014/main" id="{E9A9FF63-670E-8774-4C92-50BB02514417}"/>
+              </a:ext>
+            </a:extLst>
+          </p:cNvPr>
+          <p:cNvSpPr txBox="1"/>
+          <p:nvPr/>
+        </p:nvSpPr>
+        <p:spPr>
+          <a:xfrm>
+            <a:off x="6190488" y="3695526"/>
+            <a:ext cx="1651029" cy="369332"/>
+          </a:xfrm>
+          <a:prstGeom prst="rect">
+            <a:avLst/>
+          </a:prstGeom>
+          <a:noFill/>
+          <a:ln>
+            <a:solidFill>
+              <a:srgbClr val="7030A0"/>
+            </a:solidFill>
+          </a:ln>
+        </p:spPr>
+        <p:txBody>
+          <a:bodyPr wrap="none" rtlCol="0">
+            <a:spAutoFit/>
+          </a:bodyPr>
+          <a:lstStyle/>
+          <a:p>
+            <a:r>
+              <a:rPr lang="en-US" dirty="0"/>
+              <a:t>me, 3 years ago</a:t>
+            </a:r>
+          </a:p>
+        </p:txBody>
+      </p:sp>
+      <p:sp>
+        <p:nvSpPr>
+          <p:cNvPr id="18" name="TextBox 17">
+            <a:extLst>
+              <a:ext uri="{FF2B5EF4-FFF2-40B4-BE49-F238E27FC236}">
+                <a16:creationId xmlns:a16="http://schemas.microsoft.com/office/drawing/2014/main" id="{F17CF2FC-B07F-7EE5-6457-A50F42D0CA89}"/>
+              </a:ext>
+            </a:extLst>
+          </p:cNvPr>
+          <p:cNvSpPr txBox="1"/>
+          <p:nvPr/>
+        </p:nvSpPr>
+        <p:spPr>
+          <a:xfrm>
+            <a:off x="437034" y="3695526"/>
+            <a:ext cx="2268891" cy="369332"/>
+          </a:xfrm>
+          <a:prstGeom prst="rect">
+            <a:avLst/>
+          </a:prstGeom>
+          <a:noFill/>
+          <a:ln>
+            <a:solidFill>
+              <a:srgbClr val="7030A0"/>
+            </a:solidFill>
+          </a:ln>
+        </p:spPr>
+        <p:txBody>
+          <a:bodyPr wrap="none" rtlCol="0">
+            <a:spAutoFit/>
+          </a:bodyPr>
+          <a:lstStyle/>
+          <a:p>
+            <a:r>
+              <a:rPr lang="en-US" dirty="0"/>
+              <a:t>Other undergraduates</a:t>
+            </a:r>
+          </a:p>
+        </p:txBody>
+      </p:sp>
+      <p:sp>
+        <p:nvSpPr>
+          <p:cNvPr id="19" name="TextBox 18">
+            <a:extLst>
+              <a:ext uri="{FF2B5EF4-FFF2-40B4-BE49-F238E27FC236}">
+                <a16:creationId xmlns:a16="http://schemas.microsoft.com/office/drawing/2014/main" id="{E0BB0347-B84B-BA6C-94FC-C401FAC0FBD8}"/>
+              </a:ext>
+            </a:extLst>
+          </p:cNvPr>
+          <p:cNvSpPr txBox="1"/>
+          <p:nvPr/>
+        </p:nvSpPr>
+        <p:spPr>
+          <a:xfrm>
+            <a:off x="5891940" y="759857"/>
+            <a:ext cx="2393604" cy="369332"/>
+          </a:xfrm>
+          <a:prstGeom prst="rect">
+            <a:avLst/>
+          </a:prstGeom>
+          <a:noFill/>
+          <a:ln>
+            <a:solidFill>
+              <a:srgbClr val="7030A0"/>
+            </a:solidFill>
+          </a:ln>
+        </p:spPr>
+        <p:txBody>
+          <a:bodyPr wrap="none" rtlCol="0">
+            <a:spAutoFit/>
+          </a:bodyPr>
+          <a:lstStyle/>
+          <a:p>
+            <a:r>
+              <a:rPr lang="en-US" dirty="0"/>
+              <a:t>A handful of individuals</a:t>
+            </a:r>
+          </a:p>
+        </p:txBody>
+      </p:sp>
+      <p:sp>
+        <p:nvSpPr>
+          <p:cNvPr id="20" name="Right Arrow 19">
+            <a:extLst>
+              <a:ext uri="{FF2B5EF4-FFF2-40B4-BE49-F238E27FC236}">
+                <a16:creationId xmlns:a16="http://schemas.microsoft.com/office/drawing/2014/main" id="{8B5A24F3-F156-1A9D-30FC-64497BC4D0FD}"/>
+              </a:ext>
+            </a:extLst>
+          </p:cNvPr>
+          <p:cNvSpPr/>
+          <p:nvPr/>
+        </p:nvSpPr>
+        <p:spPr>
+          <a:xfrm rot="19769855">
+            <a:off x="2866417" y="2165477"/>
+            <a:ext cx="2785117" cy="358700"/>
+          </a:xfrm>
+          <a:prstGeom prst="rightArrow">
+            <a:avLst/>
+          </a:prstGeom>
+          <a:solidFill>
+            <a:srgbClr val="92D050"/>
+          </a:solidFill>
+          <a:ln>
+            <a:solidFill>
+              <a:srgbClr val="92D050"/>
+            </a:solidFill>
+          </a:ln>
+        </p:spPr>
+        <p:style>
+          <a:lnRef idx="1">
+            <a:schemeClr val="accent1"/>
+          </a:lnRef>
+          <a:fillRef idx="3">
+            <a:schemeClr val="accent1"/>
+          </a:fillRef>
+          <a:effectRef idx="2">
+            <a:schemeClr val="accent1"/>
+          </a:effectRef>
+          <a:fontRef idx="minor">
+            <a:schemeClr val="lt1"/>
+          </a:fontRef>
+        </p:style>
+        <p:txBody>
+          <a:bodyPr rtlCol="0" anchor="ctr"/>
+          <a:lstStyle/>
+          <a:p>
+            <a:pPr algn="ctr"/>
+            <a:endParaRPr lang="en-US"/>
+          </a:p>
+        </p:txBody>
+      </p:sp>
+    </p:spTree>
+    <p:extLst>
+      <p:ext uri="{BB962C8B-B14F-4D97-AF65-F5344CB8AC3E}">
+        <p14:creationId xmlns:p14="http://schemas.microsoft.com/office/powerpoint/2010/main" val="1430446724"/>
+      </p:ext>
+    </p:extLst>
+  </p:cSld>
+  <p:clrMapOvr>
+    <a:masterClrMapping/>
+  </p:clrMapOvr>
+  <p:timing>
+    <p:tnLst>
+      <p:par>
+        <p:cTn id="1" dur="indefinite" restart="never" nodeType="tmRoot">
+          <p:childTnLst>
+            <p:seq concurrent="1" nextAc="seek">
+              <p:cTn id="2" dur="indefinite" nodeType="mainSeq">
+                <p:childTnLst>
+                  <p:par>
+                    <p:cTn id="3" fill="hold">
+                      <p:stCondLst>
+                        <p:cond delay="indefinite"/>
+                      </p:stCondLst>
+                      <p:childTnLst>
+                        <p:par>
+                          <p:cTn id="4" fill="hold">
+                            <p:stCondLst>
+                              <p:cond delay="0"/>
+                            </p:stCondLst>
+                            <p:childTnLst>
+                              <p:par>
+                                <p:cTn id="5" presetID="22" presetClass="entr" presetSubtype="4" fill="hold" grpId="0" nodeType="clickEffect">
+                                  <p:stCondLst>
+                                    <p:cond delay="0"/>
+                                  </p:stCondLst>
+                                  <p:childTnLst>
+                                    <p:set>
+                                      <p:cBhvr>
+                                        <p:cTn id="6" dur="1" fill="hold">
+                                          <p:stCondLst>
+                                            <p:cond delay="0"/>
+                                          </p:stCondLst>
+                                        </p:cTn>
+                                        <p:tgtEl>
+                                          <p:spTgt spid="20"/>
+                                        </p:tgtEl>
+                                        <p:attrNameLst>
+                                          <p:attrName>style.visibility</p:attrName>
+                                        </p:attrNameLst>
+                                      </p:cBhvr>
+                                      <p:to>
+                                        <p:strVal val="visible"/>
+                                      </p:to>
+                                    </p:set>
+                                    <p:animEffect transition="in" filter="wipe(down)">
+                                      <p:cBhvr>
+                                        <p:cTn id="7" dur="500"/>
+                                        <p:tgtEl>
+                                          <p:spTgt spid="20"/>
+                                        </p:tgtEl>
+                                      </p:cBhvr>
+                                    </p:animEffect>
+                                  </p:childTnLst>
+                                </p:cTn>
+                              </p:par>
+                            </p:childTnLst>
+                          </p:cTn>
+                        </p:par>
+                      </p:childTnLst>
+                    </p:cTn>
+                  </p:par>
+                </p:childTnLst>
+              </p:cTn>
+              <p:prevCondLst>
+                <p:cond evt="onPrev" delay="0">
+                  <p:tgtEl>
+                    <p:sldTgt/>
+                  </p:tgtEl>
+                </p:cond>
+              </p:prevCondLst>
+              <p:nextCondLst>
+                <p:cond evt="onNext" delay="0">
+                  <p:tgtEl>
+                    <p:sldTgt/>
+                  </p:tgtEl>
+                </p:cond>
+              </p:nextCondLst>
+            </p:seq>
+          </p:childTnLst>
+        </p:cTn>
+      </p:par>
+    </p:tnLst>
+    <p:bldLst>
+      <p:bldP spid="20" grpId="0" animBg="1"/>
+    </p:bldLst>
+  </p:timing>
+</p:sld>
+</file>
+
+<file path=ppt/slides/slide8.xml><?xml version="1.0" encoding="utf-8"?>
+<p:sld xmlns:a="http://schemas.openxmlformats.org/drawingml/2006/main" xmlns:r="http://schemas.openxmlformats.org/officeDocument/2006/relationships" xmlns:p="http://schemas.openxmlformats.org/presentationml/2006/main">
+  <p:cSld>
+    <p:spTree>
+      <p:nvGrpSpPr>
+        <p:cNvPr id="1" name=""/>
+        <p:cNvGrpSpPr/>
+        <p:nvPr/>
+      </p:nvGrpSpPr>
+      <p:grpSpPr>
+        <a:xfrm>
+          <a:off x="0" y="0"/>
+          <a:ext cx="0" cy="0"/>
+          <a:chOff x="0" y="0"/>
+          <a:chExt cx="0" cy="0"/>
+        </a:xfrm>
+      </p:grpSpPr>
+      <p:sp>
+        <p:nvSpPr>
+          <p:cNvPr id="3" name="TextBox 2">
+            <a:extLst>
+              <a:ext uri="{FF2B5EF4-FFF2-40B4-BE49-F238E27FC236}">
+                <a16:creationId xmlns:a16="http://schemas.microsoft.com/office/drawing/2014/main" id="{1632A0A7-9257-A62D-62F7-1A708D154496}"/>
+              </a:ext>
+            </a:extLst>
+          </p:cNvPr>
+          <p:cNvSpPr txBox="1"/>
+          <p:nvPr/>
+        </p:nvSpPr>
+        <p:spPr>
+          <a:xfrm>
+            <a:off x="4585366" y="1673844"/>
+            <a:ext cx="4396588" cy="1077218"/>
+          </a:xfrm>
+          <a:prstGeom prst="rect">
+            <a:avLst/>
+          </a:prstGeom>
+          <a:noFill/>
+        </p:spPr>
+        <p:txBody>
+          <a:bodyPr wrap="none" rtlCol="0">
+            <a:spAutoFit/>
+          </a:bodyPr>
+          <a:lstStyle/>
+          <a:p>
+            <a:r>
+              <a:rPr lang="en-US" sz="3200" dirty="0"/>
+              <a:t>QR code for all 8 sessions</a:t>
+            </a:r>
+          </a:p>
+          <a:p>
+            <a:r>
+              <a:rPr lang="en-US" sz="3200" dirty="0"/>
+              <a:t>Sign up! </a:t>
+            </a:r>
+          </a:p>
+        </p:txBody>
+      </p:sp>
+      <p:pic>
+        <p:nvPicPr>
+          <p:cNvPr id="4" name="Picture 3">
+            <a:extLst>
+              <a:ext uri="{FF2B5EF4-FFF2-40B4-BE49-F238E27FC236}">
+                <a16:creationId xmlns:a16="http://schemas.microsoft.com/office/drawing/2014/main" id="{2F2AE70F-B1E7-B43F-8CCA-DD0FC892E30B}"/>
+              </a:ext>
+            </a:extLst>
+          </p:cNvPr>
+          <p:cNvPicPr>
+            <a:picLocks noChangeAspect="1"/>
+          </p:cNvPicPr>
+          <p:nvPr/>
+        </p:nvPicPr>
+        <p:blipFill>
+          <a:blip r:embed="rId2"/>
+          <a:stretch>
+            <a:fillRect/>
+          </a:stretch>
+        </p:blipFill>
+        <p:spPr>
+          <a:xfrm>
+            <a:off x="162046" y="150471"/>
+            <a:ext cx="4409954" cy="4123965"/>
+          </a:xfrm>
+          <a:prstGeom prst="rect">
+            <a:avLst/>
+          </a:prstGeom>
+        </p:spPr>
+      </p:pic>
+    </p:spTree>
+    <p:extLst>
+      <p:ext uri="{BB962C8B-B14F-4D97-AF65-F5344CB8AC3E}">
+        <p14:creationId xmlns:p14="http://schemas.microsoft.com/office/powerpoint/2010/main" val="711310059"/>
+      </p:ext>
+    </p:extLst>
+  </p:cSld>
+  <p:clrMapOvr>
+    <a:masterClrMapping/>
+  </p:clrMapOvr>
+</p:sld>
+</file>
+
+<file path=ppt/slides/slide9.xml><?xml version="1.0" encoding="utf-8"?>
 <p:sld xmlns:a="http://schemas.openxmlformats.org/drawingml/2006/main" xmlns:r="http://schemas.openxmlformats.org/officeDocument/2006/relationships" xmlns:p="http://schemas.openxmlformats.org/presentationml/2006/main">
   <p:cSld>
     <p:spTree>
@@ -4481,1011 +5965,6 @@
 </p:sld>
 </file>
 
-<file path=ppt/slides/slide11.xml><?xml version="1.0" encoding="utf-8"?>
-<p:sld xmlns:a="http://schemas.openxmlformats.org/drawingml/2006/main" xmlns:r="http://schemas.openxmlformats.org/officeDocument/2006/relationships" xmlns:p="http://schemas.openxmlformats.org/presentationml/2006/main">
-  <p:cSld>
-    <p:spTree>
-      <p:nvGrpSpPr>
-        <p:cNvPr id="1" name=""/>
-        <p:cNvGrpSpPr/>
-        <p:nvPr/>
-      </p:nvGrpSpPr>
-      <p:grpSpPr>
-        <a:xfrm>
-          <a:off x="0" y="0"/>
-          <a:ext cx="0" cy="0"/>
-          <a:chOff x="0" y="0"/>
-          <a:chExt cx="0" cy="0"/>
-        </a:xfrm>
-      </p:grpSpPr>
-      <p:pic>
-        <p:nvPicPr>
-          <p:cNvPr id="2" name="Picture 1">
-            <a:extLst>
-              <a:ext uri="{FF2B5EF4-FFF2-40B4-BE49-F238E27FC236}">
-                <a16:creationId xmlns:a16="http://schemas.microsoft.com/office/drawing/2014/main" id="{4B51DF18-9487-3998-7AE0-B11317BE37CA}"/>
-              </a:ext>
-            </a:extLst>
-          </p:cNvPr>
-          <p:cNvPicPr>
-            <a:picLocks noChangeAspect="1"/>
-          </p:cNvPicPr>
-          <p:nvPr/>
-        </p:nvPicPr>
-        <p:blipFill>
-          <a:blip r:embed="rId2"/>
-          <a:stretch>
-            <a:fillRect/>
-          </a:stretch>
-        </p:blipFill>
-        <p:spPr>
-          <a:xfrm>
-            <a:off x="924128" y="249198"/>
-            <a:ext cx="4284899" cy="4227957"/>
-          </a:xfrm>
-          <a:prstGeom prst="rect">
-            <a:avLst/>
-          </a:prstGeom>
-        </p:spPr>
-      </p:pic>
-      <p:sp>
-        <p:nvSpPr>
-          <p:cNvPr id="3" name="TextBox 2">
-            <a:extLst>
-              <a:ext uri="{FF2B5EF4-FFF2-40B4-BE49-F238E27FC236}">
-                <a16:creationId xmlns:a16="http://schemas.microsoft.com/office/drawing/2014/main" id="{FE42A613-D3BA-6F30-0772-FA181D3A49E7}"/>
-              </a:ext>
-            </a:extLst>
-          </p:cNvPr>
-          <p:cNvSpPr txBox="1"/>
-          <p:nvPr/>
-        </p:nvSpPr>
-        <p:spPr>
-          <a:xfrm>
-            <a:off x="5632315" y="1527242"/>
-            <a:ext cx="2149819" cy="1200329"/>
-          </a:xfrm>
-          <a:prstGeom prst="rect">
-            <a:avLst/>
-          </a:prstGeom>
-          <a:noFill/>
-        </p:spPr>
-        <p:txBody>
-          <a:bodyPr wrap="none" rtlCol="0">
-            <a:spAutoFit/>
-          </a:bodyPr>
-          <a:lstStyle/>
-          <a:p>
-            <a:r>
-              <a:rPr lang="en-US" dirty="0"/>
-              <a:t>Tell us how we did!</a:t>
-            </a:r>
-          </a:p>
-          <a:p>
-            <a:endParaRPr lang="en-US" dirty="0"/>
-          </a:p>
-          <a:p>
-            <a:r>
-              <a:rPr lang="en-US" dirty="0">
-                <a:hlinkClick r:id="rId3"/>
-              </a:rPr>
-              <a:t>https://bit.ly/4rlIBCt</a:t>
-            </a:r>
-            <a:r>
-              <a:rPr lang="en-US" dirty="0"/>
-              <a:t> </a:t>
-            </a:r>
-          </a:p>
-          <a:p>
-            <a:endParaRPr lang="en-US" dirty="0"/>
-          </a:p>
-        </p:txBody>
-      </p:sp>
-    </p:spTree>
-    <p:extLst>
-      <p:ext uri="{BB962C8B-B14F-4D97-AF65-F5344CB8AC3E}">
-        <p14:creationId xmlns:p14="http://schemas.microsoft.com/office/powerpoint/2010/main" val="3141925060"/>
-      </p:ext>
-    </p:extLst>
-  </p:cSld>
-  <p:clrMapOvr>
-    <a:masterClrMapping/>
-  </p:clrMapOvr>
-</p:sld>
-</file>
-
-<file path=ppt/slides/slide2.xml><?xml version="1.0" encoding="utf-8"?>
-<p:sld xmlns:a="http://schemas.openxmlformats.org/drawingml/2006/main" xmlns:r="http://schemas.openxmlformats.org/officeDocument/2006/relationships" xmlns:p="http://schemas.openxmlformats.org/presentationml/2006/main">
-  <p:cSld>
-    <p:spTree>
-      <p:nvGrpSpPr>
-        <p:cNvPr id="1" name="">
-          <a:extLst>
-            <a:ext uri="{FF2B5EF4-FFF2-40B4-BE49-F238E27FC236}">
-              <a16:creationId xmlns:a16="http://schemas.microsoft.com/office/drawing/2014/main" id="{EE533AC4-99A1-4BDD-4014-656B2E0E2DE8}"/>
-            </a:ext>
-          </a:extLst>
-        </p:cNvPr>
-        <p:cNvGrpSpPr/>
-        <p:nvPr/>
-      </p:nvGrpSpPr>
-      <p:grpSpPr>
-        <a:xfrm>
-          <a:off x="0" y="0"/>
-          <a:ext cx="0" cy="0"/>
-          <a:chOff x="0" y="0"/>
-          <a:chExt cx="0" cy="0"/>
-        </a:xfrm>
-      </p:grpSpPr>
-      <p:sp>
-        <p:nvSpPr>
-          <p:cNvPr id="2" name="TextBox 1">
-            <a:extLst>
-              <a:ext uri="{FF2B5EF4-FFF2-40B4-BE49-F238E27FC236}">
-                <a16:creationId xmlns:a16="http://schemas.microsoft.com/office/drawing/2014/main" id="{61F08614-C5D0-8939-4A5B-0E75B997BB5E}"/>
-              </a:ext>
-            </a:extLst>
-          </p:cNvPr>
-          <p:cNvSpPr txBox="1"/>
-          <p:nvPr/>
-        </p:nvSpPr>
-        <p:spPr>
-          <a:xfrm>
-            <a:off x="527404" y="502584"/>
-            <a:ext cx="3506802" cy="1077218"/>
-          </a:xfrm>
-          <a:prstGeom prst="rect">
-            <a:avLst/>
-          </a:prstGeom>
-          <a:noFill/>
-        </p:spPr>
-        <p:txBody>
-          <a:bodyPr wrap="square">
-            <a:spAutoFit/>
-          </a:bodyPr>
-          <a:lstStyle/>
-          <a:p>
-            <a:pPr algn="r">
-              <a:defRPr sz="3200" b="1">
-                <a:solidFill>
-                  <a:srgbClr val="1A73E8"/>
-                </a:solidFill>
-              </a:defRPr>
-            </a:pPr>
-            <a:r>
-              <a:rPr lang="en-US" sz="3200" dirty="0"/>
-              <a:t>AI is changing how we do research</a:t>
-            </a:r>
-            <a:endParaRPr sz="3200" dirty="0"/>
-          </a:p>
-        </p:txBody>
-      </p:sp>
-      <p:pic>
-        <p:nvPicPr>
-          <p:cNvPr id="4" name="Picture 3">
-            <a:extLst>
-              <a:ext uri="{FF2B5EF4-FFF2-40B4-BE49-F238E27FC236}">
-                <a16:creationId xmlns:a16="http://schemas.microsoft.com/office/drawing/2014/main" id="{01D86E91-A260-A646-42DC-8D660E17C294}"/>
-              </a:ext>
-            </a:extLst>
-          </p:cNvPr>
-          <p:cNvPicPr>
-            <a:picLocks noChangeAspect="1"/>
-          </p:cNvPicPr>
-          <p:nvPr/>
-        </p:nvPicPr>
-        <p:blipFill>
-          <a:blip r:embed="rId2"/>
-          <a:stretch>
-            <a:fillRect/>
-          </a:stretch>
-        </p:blipFill>
-        <p:spPr>
-          <a:xfrm>
-            <a:off x="4541153" y="0"/>
-            <a:ext cx="4619110" cy="4408085"/>
-          </a:xfrm>
-          <a:prstGeom prst="rect">
-            <a:avLst/>
-          </a:prstGeom>
-        </p:spPr>
-      </p:pic>
-      <p:sp>
-        <p:nvSpPr>
-          <p:cNvPr id="5" name="TextBox 4">
-            <a:extLst>
-              <a:ext uri="{FF2B5EF4-FFF2-40B4-BE49-F238E27FC236}">
-                <a16:creationId xmlns:a16="http://schemas.microsoft.com/office/drawing/2014/main" id="{689115F5-07D8-9D70-AB5A-49CD116173C4}"/>
-              </a:ext>
-            </a:extLst>
-          </p:cNvPr>
-          <p:cNvSpPr txBox="1"/>
-          <p:nvPr/>
-        </p:nvSpPr>
-        <p:spPr>
-          <a:xfrm>
-            <a:off x="7592507" y="856527"/>
-            <a:ext cx="1389932" cy="369332"/>
-          </a:xfrm>
-          <a:prstGeom prst="rect">
-            <a:avLst/>
-          </a:prstGeom>
-          <a:noFill/>
-        </p:spPr>
-        <p:txBody>
-          <a:bodyPr wrap="none" rtlCol="0">
-            <a:spAutoFit/>
-          </a:bodyPr>
-          <a:lstStyle/>
-          <a:p>
-            <a:r>
-              <a:rPr lang="en-US" dirty="0"/>
-              <a:t>Feb 14, 2026</a:t>
-            </a:r>
-          </a:p>
-        </p:txBody>
-      </p:sp>
-      <p:pic>
-        <p:nvPicPr>
-          <p:cNvPr id="6" name="Picture 5">
-            <a:extLst>
-              <a:ext uri="{FF2B5EF4-FFF2-40B4-BE49-F238E27FC236}">
-                <a16:creationId xmlns:a16="http://schemas.microsoft.com/office/drawing/2014/main" id="{5A10CF1C-EC96-D38A-2A79-A5585AB07E93}"/>
-              </a:ext>
-            </a:extLst>
-          </p:cNvPr>
-          <p:cNvPicPr>
-            <a:picLocks noChangeAspect="1"/>
-          </p:cNvPicPr>
-          <p:nvPr/>
-        </p:nvPicPr>
-        <p:blipFill>
-          <a:blip r:embed="rId3"/>
-          <a:stretch>
-            <a:fillRect/>
-          </a:stretch>
-        </p:blipFill>
-        <p:spPr>
-          <a:xfrm>
-            <a:off x="78208" y="2326510"/>
-            <a:ext cx="4405194" cy="2081575"/>
-          </a:xfrm>
-          <a:prstGeom prst="rect">
-            <a:avLst/>
-          </a:prstGeom>
-        </p:spPr>
-      </p:pic>
-    </p:spTree>
-    <p:extLst>
-      <p:ext uri="{BB962C8B-B14F-4D97-AF65-F5344CB8AC3E}">
-        <p14:creationId xmlns:p14="http://schemas.microsoft.com/office/powerpoint/2010/main" val="378828955"/>
-      </p:ext>
-    </p:extLst>
-  </p:cSld>
-  <p:clrMapOvr>
-    <a:masterClrMapping/>
-  </p:clrMapOvr>
-</p:sld>
-</file>
-
-<file path=ppt/slides/slide3.xml><?xml version="1.0" encoding="utf-8"?>
-<p:sld xmlns:a="http://schemas.openxmlformats.org/drawingml/2006/main" xmlns:r="http://schemas.openxmlformats.org/officeDocument/2006/relationships" xmlns:p="http://schemas.openxmlformats.org/presentationml/2006/main">
-  <p:cSld>
-    <p:spTree>
-      <p:nvGrpSpPr>
-        <p:cNvPr id="1" name="">
-          <a:extLst>
-            <a:ext uri="{FF2B5EF4-FFF2-40B4-BE49-F238E27FC236}">
-              <a16:creationId xmlns:a16="http://schemas.microsoft.com/office/drawing/2014/main" id="{C95E8DDE-63AD-35ED-2175-F71B3B719929}"/>
-            </a:ext>
-          </a:extLst>
-        </p:cNvPr>
-        <p:cNvGrpSpPr/>
-        <p:nvPr/>
-      </p:nvGrpSpPr>
-      <p:grpSpPr>
-        <a:xfrm>
-          <a:off x="0" y="0"/>
-          <a:ext cx="0" cy="0"/>
-          <a:chOff x="0" y="0"/>
-          <a:chExt cx="0" cy="0"/>
-        </a:xfrm>
-      </p:grpSpPr>
-      <p:sp>
-        <p:nvSpPr>
-          <p:cNvPr id="2" name="TextBox 1">
-            <a:extLst>
-              <a:ext uri="{FF2B5EF4-FFF2-40B4-BE49-F238E27FC236}">
-                <a16:creationId xmlns:a16="http://schemas.microsoft.com/office/drawing/2014/main" id="{F5028EDF-53C8-37C1-DB8D-A995A699B335}"/>
-              </a:ext>
-            </a:extLst>
-          </p:cNvPr>
-          <p:cNvSpPr txBox="1"/>
-          <p:nvPr/>
-        </p:nvSpPr>
-        <p:spPr>
-          <a:xfrm>
-            <a:off x="328432" y="298337"/>
-            <a:ext cx="6635663" cy="461665"/>
-          </a:xfrm>
-          <a:prstGeom prst="rect">
-            <a:avLst/>
-          </a:prstGeom>
-          <a:noFill/>
-        </p:spPr>
-        <p:txBody>
-          <a:bodyPr wrap="none">
-            <a:spAutoFit/>
-          </a:bodyPr>
-          <a:lstStyle/>
-          <a:p>
-            <a:pPr>
-              <a:defRPr sz="3200" b="1">
-                <a:solidFill>
-                  <a:srgbClr val="1A73E8"/>
-                </a:solidFill>
-              </a:defRPr>
-            </a:pPr>
-            <a:r>
-              <a:rPr sz="2400" dirty="0"/>
-              <a:t> </a:t>
-            </a:r>
-            <a:r>
-              <a:rPr lang="en-US" sz="2400" dirty="0"/>
-              <a:t>Three initial sessions, five more after Spring Break</a:t>
-            </a:r>
-            <a:endParaRPr sz="2400" dirty="0"/>
-          </a:p>
-        </p:txBody>
-      </p:sp>
-      <p:sp>
-        <p:nvSpPr>
-          <p:cNvPr id="3" name="TextBox 2">
-            <a:extLst>
-              <a:ext uri="{FF2B5EF4-FFF2-40B4-BE49-F238E27FC236}">
-                <a16:creationId xmlns:a16="http://schemas.microsoft.com/office/drawing/2014/main" id="{F74133A0-EFF7-84C3-9179-6C3B85B72031}"/>
-              </a:ext>
-            </a:extLst>
-          </p:cNvPr>
-          <p:cNvSpPr txBox="1"/>
-          <p:nvPr/>
-        </p:nvSpPr>
-        <p:spPr>
-          <a:xfrm>
-            <a:off x="81023" y="886673"/>
-            <a:ext cx="8981954" cy="3370153"/>
-          </a:xfrm>
-          <a:prstGeom prst="rect">
-            <a:avLst/>
-          </a:prstGeom>
-          <a:noFill/>
-        </p:spPr>
-        <p:txBody>
-          <a:bodyPr wrap="square">
-            <a:spAutoFit/>
-          </a:bodyPr>
-          <a:lstStyle/>
-          <a:p>
-            <a:pPr>
-              <a:spcAft>
-                <a:spcPts val="900"/>
-              </a:spcAft>
-              <a:defRPr sz="2000"/>
-            </a:pPr>
-            <a:r>
-              <a:rPr lang="en-US" sz="2400" dirty="0"/>
-              <a:t>Session 1, Today: Google toolkit: Gemini, </a:t>
-            </a:r>
-            <a:r>
-              <a:rPr sz="2400" dirty="0"/>
-              <a:t>NotebookLM &amp; Custom Gems</a:t>
-            </a:r>
-          </a:p>
-          <a:p>
-            <a:pPr>
-              <a:spcAft>
-                <a:spcPts val="900"/>
-              </a:spcAft>
-              <a:defRPr sz="2000"/>
-            </a:pPr>
-            <a:r>
-              <a:rPr lang="en-US" sz="2400" dirty="0"/>
-              <a:t>Session 2, Friday Feb 27: Integration of AI with Python notebooks</a:t>
-            </a:r>
-          </a:p>
-          <a:p>
-            <a:pPr>
-              <a:spcAft>
-                <a:spcPts val="900"/>
-              </a:spcAft>
-              <a:defRPr sz="2000"/>
-            </a:pPr>
-            <a:r>
-              <a:rPr lang="en-US" sz="2400" dirty="0"/>
-              <a:t>Session 3, Friday March 6: Claude Code command line interface. </a:t>
-            </a:r>
-          </a:p>
-          <a:p>
-            <a:pPr>
-              <a:spcAft>
-                <a:spcPts val="900"/>
-              </a:spcAft>
-              <a:defRPr sz="2000"/>
-            </a:pPr>
-            <a:endParaRPr lang="en-US" sz="2400" dirty="0"/>
-          </a:p>
-          <a:p>
-            <a:pPr>
-              <a:spcAft>
-                <a:spcPts val="900"/>
-              </a:spcAft>
-              <a:defRPr sz="2000"/>
-            </a:pPr>
-            <a:r>
-              <a:rPr lang="en-US" sz="2400" dirty="0"/>
-              <a:t>Link for home page:  </a:t>
-            </a:r>
-          </a:p>
-          <a:p>
-            <a:pPr>
-              <a:spcAft>
-                <a:spcPts val="900"/>
-              </a:spcAft>
-              <a:defRPr sz="2000"/>
-            </a:pPr>
-            <a:r>
-              <a:rPr lang="en-US" sz="2400" dirty="0">
-                <a:hlinkClick r:id="rId2"/>
-              </a:rPr>
-              <a:t>https://bit.ly/3ZxtPw8</a:t>
-            </a:r>
-            <a:r>
-              <a:rPr lang="en-US" sz="2400" dirty="0"/>
-              <a:t> </a:t>
-            </a:r>
-            <a:endParaRPr sz="2400" dirty="0"/>
-          </a:p>
-          <a:p>
-            <a:pPr>
-              <a:spcAft>
-                <a:spcPts val="900"/>
-              </a:spcAft>
-              <a:defRPr sz="2000"/>
-            </a:pPr>
-            <a:endParaRPr sz="2400" dirty="0"/>
-          </a:p>
-        </p:txBody>
-      </p:sp>
-      <p:pic>
-        <p:nvPicPr>
-          <p:cNvPr id="4" name="Picture 3">
-            <a:extLst>
-              <a:ext uri="{FF2B5EF4-FFF2-40B4-BE49-F238E27FC236}">
-                <a16:creationId xmlns:a16="http://schemas.microsoft.com/office/drawing/2014/main" id="{F8F9814F-909E-AC21-77A0-7A196A9DF581}"/>
-              </a:ext>
-            </a:extLst>
-          </p:cNvPr>
-          <p:cNvPicPr>
-            <a:picLocks noChangeAspect="1"/>
-          </p:cNvPicPr>
-          <p:nvPr/>
-        </p:nvPicPr>
-        <p:blipFill>
-          <a:blip r:embed="rId3"/>
-          <a:stretch>
-            <a:fillRect/>
-          </a:stretch>
-        </p:blipFill>
-        <p:spPr>
-          <a:xfrm>
-            <a:off x="3402957" y="2344183"/>
-            <a:ext cx="2039314" cy="2039314"/>
-          </a:xfrm>
-          <a:prstGeom prst="rect">
-            <a:avLst/>
-          </a:prstGeom>
-        </p:spPr>
-      </p:pic>
-    </p:spTree>
-    <p:extLst>
-      <p:ext uri="{BB962C8B-B14F-4D97-AF65-F5344CB8AC3E}">
-        <p14:creationId xmlns:p14="http://schemas.microsoft.com/office/powerpoint/2010/main" val="218621694"/>
-      </p:ext>
-    </p:extLst>
-  </p:cSld>
-  <p:clrMapOvr>
-    <a:masterClrMapping/>
-  </p:clrMapOvr>
-</p:sld>
-</file>
-
-<file path=ppt/slides/slide4.xml><?xml version="1.0" encoding="utf-8"?>
-<p:sld xmlns:a="http://schemas.openxmlformats.org/drawingml/2006/main" xmlns:r="http://schemas.openxmlformats.org/officeDocument/2006/relationships" xmlns:p="http://schemas.openxmlformats.org/presentationml/2006/main">
-  <p:cSld>
-    <p:spTree>
-      <p:nvGrpSpPr>
-        <p:cNvPr id="1" name=""/>
-        <p:cNvGrpSpPr/>
-        <p:nvPr/>
-      </p:nvGrpSpPr>
-      <p:grpSpPr>
-        <a:xfrm>
-          <a:off x="0" y="0"/>
-          <a:ext cx="0" cy="0"/>
-          <a:chOff x="0" y="0"/>
-          <a:chExt cx="0" cy="0"/>
-        </a:xfrm>
-      </p:grpSpPr>
-      <p:pic>
-        <p:nvPicPr>
-          <p:cNvPr id="2" name="Picture 1">
-            <a:extLst>
-              <a:ext uri="{FF2B5EF4-FFF2-40B4-BE49-F238E27FC236}">
-                <a16:creationId xmlns:a16="http://schemas.microsoft.com/office/drawing/2014/main" id="{1B1AC3F0-3510-205D-1F23-95E41EC09B68}"/>
-              </a:ext>
-            </a:extLst>
-          </p:cNvPr>
-          <p:cNvPicPr>
-            <a:picLocks noChangeAspect="1"/>
-          </p:cNvPicPr>
-          <p:nvPr/>
-        </p:nvPicPr>
-        <p:blipFill>
-          <a:blip r:embed="rId2"/>
-          <a:stretch>
-            <a:fillRect/>
-          </a:stretch>
-        </p:blipFill>
-        <p:spPr>
-          <a:xfrm>
-            <a:off x="685800" y="0"/>
-            <a:ext cx="7772400" cy="4580164"/>
-          </a:xfrm>
-          <a:prstGeom prst="rect">
-            <a:avLst/>
-          </a:prstGeom>
-        </p:spPr>
-      </p:pic>
-    </p:spTree>
-    <p:extLst>
-      <p:ext uri="{BB962C8B-B14F-4D97-AF65-F5344CB8AC3E}">
-        <p14:creationId xmlns:p14="http://schemas.microsoft.com/office/powerpoint/2010/main" val="2664871968"/>
-      </p:ext>
-    </p:extLst>
-  </p:cSld>
-  <p:clrMapOvr>
-    <a:masterClrMapping/>
-  </p:clrMapOvr>
-</p:sld>
-</file>
-
-<file path=ppt/slides/slide5.xml><?xml version="1.0" encoding="utf-8"?>
-<p:sld xmlns:a="http://schemas.openxmlformats.org/drawingml/2006/main" xmlns:r="http://schemas.openxmlformats.org/officeDocument/2006/relationships" xmlns:p="http://schemas.openxmlformats.org/presentationml/2006/main">
-  <p:cSld>
-    <p:spTree>
-      <p:nvGrpSpPr>
-        <p:cNvPr id="1" name="">
-          <a:extLst>
-            <a:ext uri="{FF2B5EF4-FFF2-40B4-BE49-F238E27FC236}">
-              <a16:creationId xmlns:a16="http://schemas.microsoft.com/office/drawing/2014/main" id="{75D70F11-22A2-37E5-B8C6-1B05561155BF}"/>
-            </a:ext>
-          </a:extLst>
-        </p:cNvPr>
-        <p:cNvGrpSpPr/>
-        <p:nvPr/>
-      </p:nvGrpSpPr>
-      <p:grpSpPr>
-        <a:xfrm>
-          <a:off x="0" y="0"/>
-          <a:ext cx="0" cy="0"/>
-          <a:chOff x="0" y="0"/>
-          <a:chExt cx="0" cy="0"/>
-        </a:xfrm>
-      </p:grpSpPr>
-      <p:pic>
-        <p:nvPicPr>
-          <p:cNvPr id="2" name="Picture 1">
-            <a:extLst>
-              <a:ext uri="{FF2B5EF4-FFF2-40B4-BE49-F238E27FC236}">
-                <a16:creationId xmlns:a16="http://schemas.microsoft.com/office/drawing/2014/main" id="{240732A3-4947-2275-2BCA-330EE6285126}"/>
-              </a:ext>
-            </a:extLst>
-          </p:cNvPr>
-          <p:cNvPicPr>
-            <a:picLocks noChangeAspect="1"/>
-          </p:cNvPicPr>
-          <p:nvPr/>
-        </p:nvPicPr>
-        <p:blipFill>
-          <a:blip r:embed="rId2"/>
-          <a:stretch>
-            <a:fillRect/>
-          </a:stretch>
-        </p:blipFill>
-        <p:spPr>
-          <a:xfrm>
-            <a:off x="685800" y="168288"/>
-            <a:ext cx="7772400" cy="4181889"/>
-          </a:xfrm>
-          <a:prstGeom prst="rect">
-            <a:avLst/>
-          </a:prstGeom>
-        </p:spPr>
-      </p:pic>
-    </p:spTree>
-    <p:extLst>
-      <p:ext uri="{BB962C8B-B14F-4D97-AF65-F5344CB8AC3E}">
-        <p14:creationId xmlns:p14="http://schemas.microsoft.com/office/powerpoint/2010/main" val="3763632779"/>
-      </p:ext>
-    </p:extLst>
-  </p:cSld>
-  <p:clrMapOvr>
-    <a:masterClrMapping/>
-  </p:clrMapOvr>
-</p:sld>
-</file>
-
-<file path=ppt/slides/slide6.xml><?xml version="1.0" encoding="utf-8"?>
-<p:sld xmlns:a="http://schemas.openxmlformats.org/drawingml/2006/main" xmlns:r="http://schemas.openxmlformats.org/officeDocument/2006/relationships" xmlns:p="http://schemas.openxmlformats.org/presentationml/2006/main">
-  <p:cSld>
-    <p:spTree>
-      <p:nvGrpSpPr>
-        <p:cNvPr id="1" name="">
-          <a:extLst>
-            <a:ext uri="{FF2B5EF4-FFF2-40B4-BE49-F238E27FC236}">
-              <a16:creationId xmlns:a16="http://schemas.microsoft.com/office/drawing/2014/main" id="{423B50B0-117D-52E3-2882-1348ADEEAD39}"/>
-            </a:ext>
-          </a:extLst>
-        </p:cNvPr>
-        <p:cNvGrpSpPr/>
-        <p:nvPr/>
-      </p:nvGrpSpPr>
-      <p:grpSpPr>
-        <a:xfrm>
-          <a:off x="0" y="0"/>
-          <a:ext cx="0" cy="0"/>
-          <a:chOff x="0" y="0"/>
-          <a:chExt cx="0" cy="0"/>
-        </a:xfrm>
-      </p:grpSpPr>
-      <p:pic>
-        <p:nvPicPr>
-          <p:cNvPr id="4" name="Picture 3">
-            <a:extLst>
-              <a:ext uri="{FF2B5EF4-FFF2-40B4-BE49-F238E27FC236}">
-                <a16:creationId xmlns:a16="http://schemas.microsoft.com/office/drawing/2014/main" id="{DC3E1435-7B34-AE60-3826-D52489AD3C48}"/>
-              </a:ext>
-            </a:extLst>
-          </p:cNvPr>
-          <p:cNvPicPr>
-            <a:picLocks noChangeAspect="1"/>
-          </p:cNvPicPr>
-          <p:nvPr/>
-        </p:nvPicPr>
-        <p:blipFill>
-          <a:blip r:embed="rId2"/>
-          <a:stretch>
-            <a:fillRect/>
-          </a:stretch>
-        </p:blipFill>
-        <p:spPr>
-          <a:xfrm>
-            <a:off x="685800" y="601383"/>
-            <a:ext cx="7772400" cy="3639792"/>
-          </a:xfrm>
-          <a:prstGeom prst="rect">
-            <a:avLst/>
-          </a:prstGeom>
-        </p:spPr>
-      </p:pic>
-    </p:spTree>
-    <p:extLst>
-      <p:ext uri="{BB962C8B-B14F-4D97-AF65-F5344CB8AC3E}">
-        <p14:creationId xmlns:p14="http://schemas.microsoft.com/office/powerpoint/2010/main" val="2614732407"/>
-      </p:ext>
-    </p:extLst>
-  </p:cSld>
-  <p:clrMapOvr>
-    <a:masterClrMapping/>
-  </p:clrMapOvr>
-</p:sld>
-</file>
-
-<file path=ppt/slides/slide7.xml><?xml version="1.0" encoding="utf-8"?>
-<p:sld xmlns:a="http://schemas.openxmlformats.org/drawingml/2006/main" xmlns:r="http://schemas.openxmlformats.org/officeDocument/2006/relationships" xmlns:p="http://schemas.openxmlformats.org/presentationml/2006/main">
-  <p:cSld>
-    <p:spTree>
-      <p:nvGrpSpPr>
-        <p:cNvPr id="1" name=""/>
-        <p:cNvGrpSpPr/>
-        <p:nvPr/>
-      </p:nvGrpSpPr>
-      <p:grpSpPr>
-        <a:xfrm>
-          <a:off x="0" y="0"/>
-          <a:ext cx="0" cy="0"/>
-          <a:chOff x="0" y="0"/>
-          <a:chExt cx="0" cy="0"/>
-        </a:xfrm>
-      </p:grpSpPr>
-      <p:sp>
-        <p:nvSpPr>
-          <p:cNvPr id="3" name="TextBox 2">
-            <a:extLst>
-              <a:ext uri="{FF2B5EF4-FFF2-40B4-BE49-F238E27FC236}">
-                <a16:creationId xmlns:a16="http://schemas.microsoft.com/office/drawing/2014/main" id="{1632A0A7-9257-A62D-62F7-1A708D154496}"/>
-              </a:ext>
-            </a:extLst>
-          </p:cNvPr>
-          <p:cNvSpPr txBox="1"/>
-          <p:nvPr/>
-        </p:nvSpPr>
-        <p:spPr>
-          <a:xfrm>
-            <a:off x="4585366" y="1673844"/>
-            <a:ext cx="4396588" cy="1077218"/>
-          </a:xfrm>
-          <a:prstGeom prst="rect">
-            <a:avLst/>
-          </a:prstGeom>
-          <a:noFill/>
-        </p:spPr>
-        <p:txBody>
-          <a:bodyPr wrap="none" rtlCol="0">
-            <a:spAutoFit/>
-          </a:bodyPr>
-          <a:lstStyle/>
-          <a:p>
-            <a:r>
-              <a:rPr lang="en-US" sz="3200" dirty="0"/>
-              <a:t>QR code for all 8 sessions</a:t>
-            </a:r>
-          </a:p>
-          <a:p>
-            <a:r>
-              <a:rPr lang="en-US" sz="3200" dirty="0"/>
-              <a:t>Sign up! </a:t>
-            </a:r>
-          </a:p>
-        </p:txBody>
-      </p:sp>
-      <p:pic>
-        <p:nvPicPr>
-          <p:cNvPr id="4" name="Picture 3">
-            <a:extLst>
-              <a:ext uri="{FF2B5EF4-FFF2-40B4-BE49-F238E27FC236}">
-                <a16:creationId xmlns:a16="http://schemas.microsoft.com/office/drawing/2014/main" id="{2F2AE70F-B1E7-B43F-8CCA-DD0FC892E30B}"/>
-              </a:ext>
-            </a:extLst>
-          </p:cNvPr>
-          <p:cNvPicPr>
-            <a:picLocks noChangeAspect="1"/>
-          </p:cNvPicPr>
-          <p:nvPr/>
-        </p:nvPicPr>
-        <p:blipFill>
-          <a:blip r:embed="rId2"/>
-          <a:stretch>
-            <a:fillRect/>
-          </a:stretch>
-        </p:blipFill>
-        <p:spPr>
-          <a:xfrm>
-            <a:off x="162046" y="150471"/>
-            <a:ext cx="4409954" cy="4123965"/>
-          </a:xfrm>
-          <a:prstGeom prst="rect">
-            <a:avLst/>
-          </a:prstGeom>
-        </p:spPr>
-      </p:pic>
-    </p:spTree>
-    <p:extLst>
-      <p:ext uri="{BB962C8B-B14F-4D97-AF65-F5344CB8AC3E}">
-        <p14:creationId xmlns:p14="http://schemas.microsoft.com/office/powerpoint/2010/main" val="711310059"/>
-      </p:ext>
-    </p:extLst>
-  </p:cSld>
-  <p:clrMapOvr>
-    <a:masterClrMapping/>
-  </p:clrMapOvr>
-</p:sld>
-</file>
-
-<file path=ppt/slides/slide8.xml><?xml version="1.0" encoding="utf-8"?>
-<p:sld xmlns:a="http://schemas.openxmlformats.org/drawingml/2006/main" xmlns:r="http://schemas.openxmlformats.org/officeDocument/2006/relationships" xmlns:p="http://schemas.openxmlformats.org/presentationml/2006/main">
-  <p:cSld>
-    <p:spTree>
-      <p:nvGrpSpPr>
-        <p:cNvPr id="1" name=""/>
-        <p:cNvGrpSpPr/>
-        <p:nvPr/>
-      </p:nvGrpSpPr>
-      <p:grpSpPr>
-        <a:xfrm>
-          <a:off x="0" y="0"/>
-          <a:ext cx="0" cy="0"/>
-          <a:chOff x="0" y="0"/>
-          <a:chExt cx="0" cy="0"/>
-        </a:xfrm>
-      </p:grpSpPr>
-      <p:sp>
-        <p:nvSpPr>
-          <p:cNvPr id="2" name="Title 1">
-            <a:extLst>
-              <a:ext uri="{FF2B5EF4-FFF2-40B4-BE49-F238E27FC236}">
-                <a16:creationId xmlns:a16="http://schemas.microsoft.com/office/drawing/2014/main" id="{F6C9B473-751F-6450-C446-781D60705CA6}"/>
-              </a:ext>
-            </a:extLst>
-          </p:cNvPr>
-          <p:cNvSpPr>
-            <a:spLocks noGrp="1"/>
-          </p:cNvSpPr>
-          <p:nvPr>
-            <p:ph type="title"/>
-          </p:nvPr>
-        </p:nvSpPr>
-        <p:spPr/>
-        <p:txBody>
-          <a:bodyPr>
-            <a:normAutofit fontScale="90000"/>
-          </a:bodyPr>
-          <a:lstStyle/>
-          <a:p>
-            <a:r>
-              <a:rPr lang="en-US" dirty="0"/>
-              <a:t>Why run your AI work through Harvard accounts? </a:t>
-            </a:r>
-          </a:p>
-        </p:txBody>
-      </p:sp>
-      <p:sp>
-        <p:nvSpPr>
-          <p:cNvPr id="3" name="Content Placeholder 2">
-            <a:extLst>
-              <a:ext uri="{FF2B5EF4-FFF2-40B4-BE49-F238E27FC236}">
-                <a16:creationId xmlns:a16="http://schemas.microsoft.com/office/drawing/2014/main" id="{BD0BBC28-FE69-94B0-B07B-E4BE02856CF2}"/>
-              </a:ext>
-            </a:extLst>
-          </p:cNvPr>
-          <p:cNvSpPr>
-            <a:spLocks noGrp="1"/>
-          </p:cNvSpPr>
-          <p:nvPr>
-            <p:ph idx="1"/>
-          </p:nvPr>
-        </p:nvSpPr>
-        <p:spPr/>
-        <p:txBody>
-          <a:bodyPr/>
-          <a:lstStyle/>
-          <a:p>
-            <a:r>
-              <a:rPr lang="en-US" u="sng" dirty="0"/>
-              <a:t>Cybersecurity</a:t>
-            </a:r>
-            <a:r>
-              <a:rPr lang="en-US" dirty="0"/>
-              <a:t>- no vendor storage, not used for training. </a:t>
-            </a:r>
-          </a:p>
-          <a:p>
-            <a:r>
-              <a:rPr lang="en-US" u="sng" dirty="0"/>
-              <a:t>Privacy</a:t>
-            </a:r>
-            <a:r>
-              <a:rPr lang="en-US" dirty="0"/>
-              <a:t>- can upload early research results, draft papers, up to and including level-3 confidential data. See </a:t>
-            </a:r>
-            <a:r>
-              <a:rPr lang="en-US" dirty="0">
-                <a:hlinkClick r:id="rId2"/>
-              </a:rPr>
-              <a:t>https://policy.security.harvard.edu/level-3</a:t>
-            </a:r>
-            <a:r>
-              <a:rPr lang="en-US" dirty="0"/>
-              <a:t> </a:t>
-            </a:r>
-          </a:p>
-          <a:p>
-            <a:r>
-              <a:rPr lang="en-US" u="sng" dirty="0"/>
-              <a:t>Accounting</a:t>
-            </a:r>
-            <a:r>
-              <a:rPr lang="en-US" dirty="0"/>
-              <a:t>- Can directly link API usage fees to research grants through HUIT billing</a:t>
-            </a:r>
-          </a:p>
-          <a:p>
-            <a:endParaRPr lang="en-US" dirty="0"/>
-          </a:p>
-          <a:p>
-            <a:endParaRPr lang="en-US" dirty="0"/>
-          </a:p>
-        </p:txBody>
-      </p:sp>
-    </p:spTree>
-    <p:extLst>
-      <p:ext uri="{BB962C8B-B14F-4D97-AF65-F5344CB8AC3E}">
-        <p14:creationId xmlns:p14="http://schemas.microsoft.com/office/powerpoint/2010/main" val="3423490103"/>
-      </p:ext>
-    </p:extLst>
-  </p:cSld>
-  <p:clrMapOvr>
-    <a:masterClrMapping/>
-  </p:clrMapOvr>
-</p:sld>
-</file>
-
-<file path=ppt/slides/slide9.xml><?xml version="1.0" encoding="utf-8"?>
-<p:sld xmlns:a="http://schemas.openxmlformats.org/drawingml/2006/main" xmlns:r="http://schemas.openxmlformats.org/officeDocument/2006/relationships" xmlns:p="http://schemas.openxmlformats.org/presentationml/2006/main">
-  <p:cSld>
-    <p:spTree>
-      <p:nvGrpSpPr>
-        <p:cNvPr id="1" name=""/>
-        <p:cNvGrpSpPr/>
-        <p:nvPr/>
-      </p:nvGrpSpPr>
-      <p:grpSpPr>
-        <a:xfrm>
-          <a:off x="0" y="0"/>
-          <a:ext cx="0" cy="0"/>
-          <a:chOff x="0" y="0"/>
-          <a:chExt cx="0" cy="0"/>
-        </a:xfrm>
-      </p:grpSpPr>
-      <p:pic>
-        <p:nvPicPr>
-          <p:cNvPr id="3" name="Picture 2">
-            <a:extLst>
-              <a:ext uri="{FF2B5EF4-FFF2-40B4-BE49-F238E27FC236}">
-                <a16:creationId xmlns:a16="http://schemas.microsoft.com/office/drawing/2014/main" id="{970C8B3A-F585-10AF-D0D5-215A65C3DA78}"/>
-              </a:ext>
-            </a:extLst>
-          </p:cNvPr>
-          <p:cNvPicPr>
-            <a:picLocks noChangeAspect="1"/>
-          </p:cNvPicPr>
-          <p:nvPr/>
-        </p:nvPicPr>
-        <p:blipFill>
-          <a:blip r:embed="rId2"/>
-          <a:srcRect l="2500" t="15977" r="-2500" b="-5626"/>
-          <a:stretch>
-            <a:fillRect/>
-          </a:stretch>
-        </p:blipFill>
-        <p:spPr>
-          <a:xfrm>
-            <a:off x="1099125" y="162044"/>
-            <a:ext cx="6945750" cy="4611065"/>
-          </a:xfrm>
-          <a:prstGeom prst="rect">
-            <a:avLst/>
-          </a:prstGeom>
-          <a:ln w="38100">
-            <a:solidFill>
-              <a:srgbClr val="7030A0"/>
-            </a:solidFill>
-          </a:ln>
-        </p:spPr>
-      </p:pic>
-    </p:spTree>
-    <p:extLst>
-      <p:ext uri="{BB962C8B-B14F-4D97-AF65-F5344CB8AC3E}">
-        <p14:creationId xmlns:p14="http://schemas.microsoft.com/office/powerpoint/2010/main" val="2233464708"/>
-      </p:ext>
-    </p:extLst>
-  </p:cSld>
-  <p:clrMapOvr>
-    <a:masterClrMapping/>
-  </p:clrMapOvr>
-</p:sld>
-</file>
-
 <file path=ppt/theme/theme1.xml><?xml version="1.0" encoding="utf-8"?>
 <a:theme xmlns:a="http://schemas.openxmlformats.org/drawingml/2006/main" name="Office Theme">
   <a:themeElements>

</xml_diff>